<commit_message>
integracao do cadastro com o Redux e alteracao na pasta Apresentacao
</commit_message>
<xml_diff>
--- a/apresentacao/doc/hysteria_studio.pptx
+++ b/apresentacao/doc/hysteria_studio.pptx
@@ -10,15 +10,17 @@
     <p:sldId id="258" r:id="rId4"/>
     <p:sldId id="259" r:id="rId5"/>
     <p:sldId id="260" r:id="rId6"/>
-    <p:sldId id="261" r:id="rId7"/>
+    <p:sldId id="262" r:id="rId7"/>
+    <p:sldId id="263" r:id="rId8"/>
+    <p:sldId id="261" r:id="rId9"/>
   </p:sldIdLst>
   <p:sldSz cx="12192000" cy="6858000"/>
   <p:notesSz cx="6858000" cy="9144000"/>
   <p:embeddedFontLst>
     <p:embeddedFont>
       <p:font typeface="Raleway" panose="020B0003030101060003" pitchFamily="34" charset="0"/>
-      <p:regular r:id="rId8"/>
-      <p:bold r:id="rId9"/>
+      <p:regular r:id="rId10"/>
+      <p:bold r:id="rId11"/>
     </p:embeddedFont>
   </p:embeddedFontLst>
   <p:defaultTextStyle>
@@ -271,7 +273,7 @@
           <a:p>
             <a:fld id="{D021F15F-CFAB-4DC8-9946-DFCF0015DA5A}" type="datetimeFigureOut">
               <a:rPr lang="pt-BR" smtClean="0"/>
-              <a:t>23/03/2024</a:t>
+              <a:t>27/04/2024</a:t>
             </a:fld>
             <a:endParaRPr lang="pt-BR"/>
           </a:p>
@@ -469,7 +471,7 @@
           <a:p>
             <a:fld id="{D021F15F-CFAB-4DC8-9946-DFCF0015DA5A}" type="datetimeFigureOut">
               <a:rPr lang="pt-BR" smtClean="0"/>
-              <a:t>23/03/2024</a:t>
+              <a:t>27/04/2024</a:t>
             </a:fld>
             <a:endParaRPr lang="pt-BR"/>
           </a:p>
@@ -677,7 +679,7 @@
           <a:p>
             <a:fld id="{D021F15F-CFAB-4DC8-9946-DFCF0015DA5A}" type="datetimeFigureOut">
               <a:rPr lang="pt-BR" smtClean="0"/>
-              <a:t>23/03/2024</a:t>
+              <a:t>27/04/2024</a:t>
             </a:fld>
             <a:endParaRPr lang="pt-BR"/>
           </a:p>
@@ -875,7 +877,7 @@
           <a:p>
             <a:fld id="{D021F15F-CFAB-4DC8-9946-DFCF0015DA5A}" type="datetimeFigureOut">
               <a:rPr lang="pt-BR" smtClean="0"/>
-              <a:t>23/03/2024</a:t>
+              <a:t>27/04/2024</a:t>
             </a:fld>
             <a:endParaRPr lang="pt-BR"/>
           </a:p>
@@ -1150,7 +1152,7 @@
           <a:p>
             <a:fld id="{D021F15F-CFAB-4DC8-9946-DFCF0015DA5A}" type="datetimeFigureOut">
               <a:rPr lang="pt-BR" smtClean="0"/>
-              <a:t>23/03/2024</a:t>
+              <a:t>27/04/2024</a:t>
             </a:fld>
             <a:endParaRPr lang="pt-BR"/>
           </a:p>
@@ -1415,7 +1417,7 @@
           <a:p>
             <a:fld id="{D021F15F-CFAB-4DC8-9946-DFCF0015DA5A}" type="datetimeFigureOut">
               <a:rPr lang="pt-BR" smtClean="0"/>
-              <a:t>23/03/2024</a:t>
+              <a:t>27/04/2024</a:t>
             </a:fld>
             <a:endParaRPr lang="pt-BR"/>
           </a:p>
@@ -1827,7 +1829,7 @@
           <a:p>
             <a:fld id="{D021F15F-CFAB-4DC8-9946-DFCF0015DA5A}" type="datetimeFigureOut">
               <a:rPr lang="pt-BR" smtClean="0"/>
-              <a:t>23/03/2024</a:t>
+              <a:t>27/04/2024</a:t>
             </a:fld>
             <a:endParaRPr lang="pt-BR"/>
           </a:p>
@@ -1968,7 +1970,7 @@
           <a:p>
             <a:fld id="{D021F15F-CFAB-4DC8-9946-DFCF0015DA5A}" type="datetimeFigureOut">
               <a:rPr lang="pt-BR" smtClean="0"/>
-              <a:t>23/03/2024</a:t>
+              <a:t>27/04/2024</a:t>
             </a:fld>
             <a:endParaRPr lang="pt-BR"/>
           </a:p>
@@ -2081,7 +2083,7 @@
           <a:p>
             <a:fld id="{D021F15F-CFAB-4DC8-9946-DFCF0015DA5A}" type="datetimeFigureOut">
               <a:rPr lang="pt-BR" smtClean="0"/>
-              <a:t>23/03/2024</a:t>
+              <a:t>27/04/2024</a:t>
             </a:fld>
             <a:endParaRPr lang="pt-BR"/>
           </a:p>
@@ -2392,7 +2394,7 @@
           <a:p>
             <a:fld id="{D021F15F-CFAB-4DC8-9946-DFCF0015DA5A}" type="datetimeFigureOut">
               <a:rPr lang="pt-BR" smtClean="0"/>
-              <a:t>23/03/2024</a:t>
+              <a:t>27/04/2024</a:t>
             </a:fld>
             <a:endParaRPr lang="pt-BR"/>
           </a:p>
@@ -2680,7 +2682,7 @@
           <a:p>
             <a:fld id="{D021F15F-CFAB-4DC8-9946-DFCF0015DA5A}" type="datetimeFigureOut">
               <a:rPr lang="pt-BR" smtClean="0"/>
-              <a:t>23/03/2024</a:t>
+              <a:t>27/04/2024</a:t>
             </a:fld>
             <a:endParaRPr lang="pt-BR"/>
           </a:p>
@@ -2921,7 +2923,7 @@
           <a:p>
             <a:fld id="{D021F15F-CFAB-4DC8-9946-DFCF0015DA5A}" type="datetimeFigureOut">
               <a:rPr lang="pt-BR" smtClean="0"/>
-              <a:t>23/03/2024</a:t>
+              <a:t>27/04/2024</a:t>
             </a:fld>
             <a:endParaRPr lang="pt-BR"/>
           </a:p>
@@ -3346,42 +3348,6 @@
           <a:chExt cx="0" cy="0"/>
         </a:xfrm>
       </p:grpSpPr>
-      <p:pic>
-        <p:nvPicPr>
-          <p:cNvPr id="7" name="Imagem 6">
-            <a:extLst>
-              <a:ext uri="{FF2B5EF4-FFF2-40B4-BE49-F238E27FC236}">
-                <a16:creationId xmlns:a16="http://schemas.microsoft.com/office/drawing/2014/main" id="{C7B56E8E-59B3-2CE8-134E-009F4EE90B2C}"/>
-              </a:ext>
-            </a:extLst>
-          </p:cNvPr>
-          <p:cNvPicPr>
-            <a:picLocks noChangeAspect="1"/>
-          </p:cNvPicPr>
-          <p:nvPr/>
-        </p:nvPicPr>
-        <p:blipFill>
-          <a:blip r:embed="rId2">
-            <a:extLst>
-              <a:ext uri="{28A0092B-C50C-407E-A947-70E740481C1C}">
-                <a14:useLocalDpi xmlns:a14="http://schemas.microsoft.com/office/drawing/2010/main" val="0"/>
-              </a:ext>
-            </a:extLst>
-          </a:blip>
-          <a:stretch>
-            <a:fillRect/>
-          </a:stretch>
-        </p:blipFill>
-        <p:spPr>
-          <a:xfrm>
-            <a:off x="260301" y="697069"/>
-            <a:ext cx="5441308" cy="5463862"/>
-          </a:xfrm>
-          <a:prstGeom prst="rect">
-            <a:avLst/>
-          </a:prstGeom>
-        </p:spPr>
-      </p:pic>
       <p:cxnSp>
         <p:nvCxnSpPr>
           <p:cNvPr id="11" name="Conector reto 10">
@@ -3763,13 +3729,13 @@
           <p:nvPr/>
         </p:nvPicPr>
         <p:blipFill>
-          <a:blip r:embed="rId3">
+          <a:blip r:embed="rId2">
             <a:extLst>
               <a:ext uri="{28A0092B-C50C-407E-A947-70E740481C1C}">
                 <a14:useLocalDpi xmlns:a14="http://schemas.microsoft.com/office/drawing/2010/main" val="0"/>
               </a:ext>
               <a:ext uri="{96DAC541-7B7A-43D3-8B79-37D633B846F1}">
-                <asvg:svgBlip xmlns:asvg="http://schemas.microsoft.com/office/drawing/2016/SVG/main" r:embed="rId4"/>
+                <asvg:svgBlip xmlns:asvg="http://schemas.microsoft.com/office/drawing/2016/SVG/main" r:embed="rId3"/>
               </a:ext>
             </a:extLst>
           </a:blip>
@@ -3781,6 +3747,42 @@
           <a:xfrm rot="13459991">
             <a:off x="6960242" y="4571110"/>
             <a:ext cx="377047" cy="377047"/>
+          </a:xfrm>
+          <a:prstGeom prst="rect">
+            <a:avLst/>
+          </a:prstGeom>
+        </p:spPr>
+      </p:pic>
+      <p:pic>
+        <p:nvPicPr>
+          <p:cNvPr id="3" name="Imagem 2">
+            <a:extLst>
+              <a:ext uri="{FF2B5EF4-FFF2-40B4-BE49-F238E27FC236}">
+                <a16:creationId xmlns:a16="http://schemas.microsoft.com/office/drawing/2014/main" id="{68E3CD6A-D90B-34AE-4F41-2E4D312A2219}"/>
+              </a:ext>
+            </a:extLst>
+          </p:cNvPr>
+          <p:cNvPicPr>
+            <a:picLocks noChangeAspect="1"/>
+          </p:cNvPicPr>
+          <p:nvPr/>
+        </p:nvPicPr>
+        <p:blipFill>
+          <a:blip r:embed="rId4">
+            <a:extLst>
+              <a:ext uri="{28A0092B-C50C-407E-A947-70E740481C1C}">
+                <a14:useLocalDpi xmlns:a14="http://schemas.microsoft.com/office/drawing/2010/main" val="0"/>
+              </a:ext>
+            </a:extLst>
+          </a:blip>
+          <a:stretch>
+            <a:fillRect/>
+          </a:stretch>
+        </p:blipFill>
+        <p:spPr>
+          <a:xfrm>
+            <a:off x="395786" y="2744405"/>
+            <a:ext cx="5361327" cy="1319646"/>
           </a:xfrm>
           <a:prstGeom prst="rect">
             <a:avLst/>
@@ -3827,10 +3829,10 @@
       </p:grpSpPr>
       <p:sp>
         <p:nvSpPr>
-          <p:cNvPr id="4" name="Retângulo 3">
-            <a:extLst>
-              <a:ext uri="{FF2B5EF4-FFF2-40B4-BE49-F238E27FC236}">
-                <a16:creationId xmlns:a16="http://schemas.microsoft.com/office/drawing/2014/main" id="{26B3DDFB-6D47-0656-E57B-5D54E1578324}"/>
+          <p:cNvPr id="5" name="Retângulo: Cantos Arredondados 4">
+            <a:extLst>
+              <a:ext uri="{FF2B5EF4-FFF2-40B4-BE49-F238E27FC236}">
+                <a16:creationId xmlns:a16="http://schemas.microsoft.com/office/drawing/2014/main" id="{21600A88-5FBB-9B8C-1536-59181C8ECD63}"/>
               </a:ext>
             </a:extLst>
           </p:cNvPr>
@@ -3839,15 +3841,20 @@
         </p:nvSpPr>
         <p:spPr>
           <a:xfrm>
-            <a:off x="0" y="0"/>
-            <a:ext cx="12192000" cy="785611"/>
-          </a:xfrm>
-          <a:prstGeom prst="rect">
-            <a:avLst/>
+            <a:off x="717997" y="1913209"/>
+            <a:ext cx="10756006" cy="4461834"/>
+          </a:xfrm>
+          <a:prstGeom prst="roundRect">
+            <a:avLst>
+              <a:gd name="adj" fmla="val 2855"/>
+            </a:avLst>
           </a:prstGeom>
           <a:solidFill>
-            <a:schemeClr val="tx1"/>
+            <a:schemeClr val="bg1"/>
           </a:solidFill>
+          <a:ln>
+            <a:noFill/>
+          </a:ln>
         </p:spPr>
         <p:style>
           <a:lnRef idx="2">
@@ -3874,96 +3881,6 @@
           </a:p>
         </p:txBody>
       </p:sp>
-      <p:sp>
-        <p:nvSpPr>
-          <p:cNvPr id="5" name="Retângulo: Cantos Arredondados 4">
-            <a:extLst>
-              <a:ext uri="{FF2B5EF4-FFF2-40B4-BE49-F238E27FC236}">
-                <a16:creationId xmlns:a16="http://schemas.microsoft.com/office/drawing/2014/main" id="{21600A88-5FBB-9B8C-1536-59181C8ECD63}"/>
-              </a:ext>
-            </a:extLst>
-          </p:cNvPr>
-          <p:cNvSpPr/>
-          <p:nvPr/>
-        </p:nvSpPr>
-        <p:spPr>
-          <a:xfrm>
-            <a:off x="717997" y="1913209"/>
-            <a:ext cx="10756006" cy="4461834"/>
-          </a:xfrm>
-          <a:prstGeom prst="roundRect">
-            <a:avLst>
-              <a:gd name="adj" fmla="val 2855"/>
-            </a:avLst>
-          </a:prstGeom>
-          <a:solidFill>
-            <a:schemeClr val="bg1"/>
-          </a:solidFill>
-          <a:ln>
-            <a:noFill/>
-          </a:ln>
-        </p:spPr>
-        <p:style>
-          <a:lnRef idx="2">
-            <a:schemeClr val="accent1">
-              <a:shade val="15000"/>
-            </a:schemeClr>
-          </a:lnRef>
-          <a:fillRef idx="1">
-            <a:schemeClr val="accent1"/>
-          </a:fillRef>
-          <a:effectRef idx="0">
-            <a:schemeClr val="accent1"/>
-          </a:effectRef>
-          <a:fontRef idx="minor">
-            <a:schemeClr val="lt1"/>
-          </a:fontRef>
-        </p:style>
-        <p:txBody>
-          <a:bodyPr rtlCol="0" anchor="ctr"/>
-          <a:lstStyle/>
-          <a:p>
-            <a:pPr algn="ctr"/>
-            <a:endParaRPr lang="pt-BR"/>
-          </a:p>
-        </p:txBody>
-      </p:sp>
-      <p:pic>
-        <p:nvPicPr>
-          <p:cNvPr id="7" name="Imagem 6">
-            <a:extLst>
-              <a:ext uri="{FF2B5EF4-FFF2-40B4-BE49-F238E27FC236}">
-                <a16:creationId xmlns:a16="http://schemas.microsoft.com/office/drawing/2014/main" id="{9702E9D9-FB62-100D-3078-D9716BC30710}"/>
-              </a:ext>
-            </a:extLst>
-          </p:cNvPr>
-          <p:cNvPicPr>
-            <a:picLocks noChangeAspect="1"/>
-          </p:cNvPicPr>
-          <p:nvPr/>
-        </p:nvPicPr>
-        <p:blipFill>
-          <a:blip r:embed="rId2">
-            <a:extLst>
-              <a:ext uri="{28A0092B-C50C-407E-A947-70E740481C1C}">
-                <a14:useLocalDpi xmlns:a14="http://schemas.microsoft.com/office/drawing/2010/main" val="0"/>
-              </a:ext>
-            </a:extLst>
-          </a:blip>
-          <a:stretch>
-            <a:fillRect/>
-          </a:stretch>
-        </p:blipFill>
-        <p:spPr>
-          <a:xfrm>
-            <a:off x="182654" y="0"/>
-            <a:ext cx="782368" cy="785611"/>
-          </a:xfrm>
-          <a:prstGeom prst="rect">
-            <a:avLst/>
-          </a:prstGeom>
-        </p:spPr>
-      </p:pic>
       <p:cxnSp>
         <p:nvCxnSpPr>
           <p:cNvPr id="9" name="Conector reto 8">
@@ -4417,10 +4334,10 @@
       </p:sp>
       <p:pic>
         <p:nvPicPr>
-          <p:cNvPr id="25" name="Imagem 24">
-            <a:extLst>
-              <a:ext uri="{FF2B5EF4-FFF2-40B4-BE49-F238E27FC236}">
-                <a16:creationId xmlns:a16="http://schemas.microsoft.com/office/drawing/2014/main" id="{0F87DCBB-D9B9-6EF5-82CE-50921C8CB704}"/>
+          <p:cNvPr id="11" name="Imagem 10">
+            <a:extLst>
+              <a:ext uri="{FF2B5EF4-FFF2-40B4-BE49-F238E27FC236}">
+                <a16:creationId xmlns:a16="http://schemas.microsoft.com/office/drawing/2014/main" id="{4F04C4E8-9156-9700-19A4-0DE3E151985E}"/>
               </a:ext>
             </a:extLst>
           </p:cNvPr>
@@ -4430,7 +4347,7 @@
           <p:nvPr/>
         </p:nvPicPr>
         <p:blipFill>
-          <a:blip r:embed="rId3">
+          <a:blip r:embed="rId2">
             <a:extLst>
               <a:ext uri="{28A0092B-C50C-407E-A947-70E740481C1C}">
                 <a14:useLocalDpi xmlns:a14="http://schemas.microsoft.com/office/drawing/2010/main" val="0"/>
@@ -4443,20 +4360,69 @@
         </p:blipFill>
         <p:spPr>
           <a:xfrm>
-            <a:off x="11503473" y="194460"/>
-            <a:ext cx="396689" cy="396689"/>
+            <a:off x="1112248" y="2314343"/>
+            <a:ext cx="2937361" cy="3659563"/>
           </a:xfrm>
           <a:prstGeom prst="rect">
             <a:avLst/>
           </a:prstGeom>
         </p:spPr>
       </p:pic>
+      <p:sp>
+        <p:nvSpPr>
+          <p:cNvPr id="3" name="Retângulo 2">
+            <a:extLst>
+              <a:ext uri="{FF2B5EF4-FFF2-40B4-BE49-F238E27FC236}">
+                <a16:creationId xmlns:a16="http://schemas.microsoft.com/office/drawing/2014/main" id="{39726A8C-FA38-B6B7-5618-F63B655C7D8E}"/>
+              </a:ext>
+            </a:extLst>
+          </p:cNvPr>
+          <p:cNvSpPr/>
+          <p:nvPr/>
+        </p:nvSpPr>
+        <p:spPr>
+          <a:xfrm>
+            <a:off x="0" y="0"/>
+            <a:ext cx="12192000" cy="785611"/>
+          </a:xfrm>
+          <a:prstGeom prst="rect">
+            <a:avLst/>
+          </a:prstGeom>
+          <a:solidFill>
+            <a:schemeClr val="tx1"/>
+          </a:solidFill>
+        </p:spPr>
+        <p:style>
+          <a:lnRef idx="2">
+            <a:schemeClr val="accent1">
+              <a:shade val="15000"/>
+            </a:schemeClr>
+          </a:lnRef>
+          <a:fillRef idx="1">
+            <a:schemeClr val="accent1"/>
+          </a:fillRef>
+          <a:effectRef idx="0">
+            <a:schemeClr val="accent1"/>
+          </a:effectRef>
+          <a:fontRef idx="minor">
+            <a:schemeClr val="lt1"/>
+          </a:fontRef>
+        </p:style>
+        <p:txBody>
+          <a:bodyPr rtlCol="0" anchor="ctr"/>
+          <a:lstStyle/>
+          <a:p>
+            <a:pPr algn="ctr"/>
+            <a:endParaRPr lang="pt-BR"/>
+          </a:p>
+        </p:txBody>
+      </p:sp>
       <p:pic>
         <p:nvPicPr>
-          <p:cNvPr id="11" name="Imagem 10">
-            <a:extLst>
-              <a:ext uri="{FF2B5EF4-FFF2-40B4-BE49-F238E27FC236}">
-                <a16:creationId xmlns:a16="http://schemas.microsoft.com/office/drawing/2014/main" id="{4F04C4E8-9156-9700-19A4-0DE3E151985E}"/>
+          <p:cNvPr id="6" name="Imagem 5">
+            <a:extLst>
+              <a:ext uri="{FF2B5EF4-FFF2-40B4-BE49-F238E27FC236}">
+                <a16:creationId xmlns:a16="http://schemas.microsoft.com/office/drawing/2014/main" id="{8D495F42-ADE6-2720-578B-416CD17D3868}"/>
               </a:ext>
             </a:extLst>
           </p:cNvPr>
@@ -4466,7 +4432,7 @@
           <p:nvPr/>
         </p:nvPicPr>
         <p:blipFill>
-          <a:blip r:embed="rId4">
+          <a:blip r:embed="rId3">
             <a:extLst>
               <a:ext uri="{28A0092B-C50C-407E-A947-70E740481C1C}">
                 <a14:useLocalDpi xmlns:a14="http://schemas.microsoft.com/office/drawing/2010/main" val="0"/>
@@ -4479,8 +4445,96 @@
         </p:blipFill>
         <p:spPr>
           <a:xfrm>
-            <a:off x="1112248" y="2314343"/>
-            <a:ext cx="2937361" cy="3659563"/>
+            <a:off x="185719" y="156924"/>
+            <a:ext cx="2064702" cy="508209"/>
+          </a:xfrm>
+          <a:prstGeom prst="rect">
+            <a:avLst/>
+          </a:prstGeom>
+        </p:spPr>
+      </p:pic>
+      <p:sp>
+        <p:nvSpPr>
+          <p:cNvPr id="8" name="Elipse 7">
+            <a:extLst>
+              <a:ext uri="{FF2B5EF4-FFF2-40B4-BE49-F238E27FC236}">
+                <a16:creationId xmlns:a16="http://schemas.microsoft.com/office/drawing/2014/main" id="{E47071EB-33CB-0A2B-8F83-090E5D71F65C}"/>
+              </a:ext>
+            </a:extLst>
+          </p:cNvPr>
+          <p:cNvSpPr/>
+          <p:nvPr/>
+        </p:nvSpPr>
+        <p:spPr>
+          <a:xfrm>
+            <a:off x="11388372" y="102079"/>
+            <a:ext cx="590602" cy="590602"/>
+          </a:xfrm>
+          <a:prstGeom prst="ellipse">
+            <a:avLst/>
+          </a:prstGeom>
+          <a:solidFill>
+            <a:srgbClr val="DEA900"/>
+          </a:solidFill>
+          <a:ln>
+            <a:noFill/>
+          </a:ln>
+        </p:spPr>
+        <p:style>
+          <a:lnRef idx="2">
+            <a:schemeClr val="accent1">
+              <a:shade val="15000"/>
+            </a:schemeClr>
+          </a:lnRef>
+          <a:fillRef idx="1">
+            <a:schemeClr val="accent1"/>
+          </a:fillRef>
+          <a:effectRef idx="0">
+            <a:schemeClr val="accent1"/>
+          </a:effectRef>
+          <a:fontRef idx="minor">
+            <a:schemeClr val="lt1"/>
+          </a:fontRef>
+        </p:style>
+        <p:txBody>
+          <a:bodyPr rtlCol="0" anchor="ctr"/>
+          <a:lstStyle/>
+          <a:p>
+            <a:pPr algn="ctr"/>
+            <a:endParaRPr lang="pt-BR"/>
+          </a:p>
+        </p:txBody>
+      </p:sp>
+      <p:pic>
+        <p:nvPicPr>
+          <p:cNvPr id="14" name="Imagem 13">
+            <a:extLst>
+              <a:ext uri="{FF2B5EF4-FFF2-40B4-BE49-F238E27FC236}">
+                <a16:creationId xmlns:a16="http://schemas.microsoft.com/office/drawing/2014/main" id="{D336B95A-2120-824A-6740-898509B03D46}"/>
+              </a:ext>
+            </a:extLst>
+          </p:cNvPr>
+          <p:cNvPicPr>
+            <a:picLocks noChangeAspect="1"/>
+          </p:cNvPicPr>
+          <p:nvPr/>
+        </p:nvPicPr>
+        <p:blipFill>
+          <a:blip r:embed="rId4">
+            <a:extLst>
+              <a:ext uri="{28A0092B-C50C-407E-A947-70E740481C1C}">
+                <a14:useLocalDpi xmlns:a14="http://schemas.microsoft.com/office/drawing/2010/main" val="0"/>
+              </a:ext>
+            </a:extLst>
+          </a:blip>
+          <a:stretch>
+            <a:fillRect/>
+          </a:stretch>
+        </p:blipFill>
+        <p:spPr>
+          <a:xfrm>
+            <a:off x="11377877" y="228600"/>
+            <a:ext cx="611591" cy="340364"/>
           </a:xfrm>
           <a:prstGeom prst="rect">
             <a:avLst/>
@@ -4527,10 +4581,10 @@
       </p:grpSpPr>
       <p:sp>
         <p:nvSpPr>
-          <p:cNvPr id="4" name="Retângulo 3">
-            <a:extLst>
-              <a:ext uri="{FF2B5EF4-FFF2-40B4-BE49-F238E27FC236}">
-                <a16:creationId xmlns:a16="http://schemas.microsoft.com/office/drawing/2014/main" id="{26B3DDFB-6D47-0656-E57B-5D54E1578324}"/>
+          <p:cNvPr id="5" name="Retângulo: Cantos Arredondados 4">
+            <a:extLst>
+              <a:ext uri="{FF2B5EF4-FFF2-40B4-BE49-F238E27FC236}">
+                <a16:creationId xmlns:a16="http://schemas.microsoft.com/office/drawing/2014/main" id="{21600A88-5FBB-9B8C-1536-59181C8ECD63}"/>
               </a:ext>
             </a:extLst>
           </p:cNvPr>
@@ -4539,15 +4593,20 @@
         </p:nvSpPr>
         <p:spPr>
           <a:xfrm>
-            <a:off x="0" y="0"/>
-            <a:ext cx="12192000" cy="785611"/>
-          </a:xfrm>
-          <a:prstGeom prst="rect">
-            <a:avLst/>
+            <a:off x="717997" y="1913209"/>
+            <a:ext cx="10756006" cy="4461834"/>
+          </a:xfrm>
+          <a:prstGeom prst="roundRect">
+            <a:avLst>
+              <a:gd name="adj" fmla="val 2855"/>
+            </a:avLst>
           </a:prstGeom>
           <a:solidFill>
-            <a:schemeClr val="tx1"/>
+            <a:schemeClr val="bg1"/>
           </a:solidFill>
+          <a:ln>
+            <a:noFill/>
+          </a:ln>
         </p:spPr>
         <p:style>
           <a:lnRef idx="2">
@@ -4570,100 +4629,10 @@
           <a:lstStyle/>
           <a:p>
             <a:pPr algn="ctr"/>
-            <a:endParaRPr lang="pt-BR"/>
-          </a:p>
-        </p:txBody>
-      </p:sp>
-      <p:sp>
-        <p:nvSpPr>
-          <p:cNvPr id="5" name="Retângulo: Cantos Arredondados 4">
-            <a:extLst>
-              <a:ext uri="{FF2B5EF4-FFF2-40B4-BE49-F238E27FC236}">
-                <a16:creationId xmlns:a16="http://schemas.microsoft.com/office/drawing/2014/main" id="{21600A88-5FBB-9B8C-1536-59181C8ECD63}"/>
-              </a:ext>
-            </a:extLst>
-          </p:cNvPr>
-          <p:cNvSpPr/>
-          <p:nvPr/>
-        </p:nvSpPr>
-        <p:spPr>
-          <a:xfrm>
-            <a:off x="717997" y="1913209"/>
-            <a:ext cx="10756006" cy="4461834"/>
-          </a:xfrm>
-          <a:prstGeom prst="roundRect">
-            <a:avLst>
-              <a:gd name="adj" fmla="val 2855"/>
-            </a:avLst>
-          </a:prstGeom>
-          <a:solidFill>
-            <a:schemeClr val="bg1"/>
-          </a:solidFill>
-          <a:ln>
-            <a:noFill/>
-          </a:ln>
-        </p:spPr>
-        <p:style>
-          <a:lnRef idx="2">
-            <a:schemeClr val="accent1">
-              <a:shade val="15000"/>
-            </a:schemeClr>
-          </a:lnRef>
-          <a:fillRef idx="1">
-            <a:schemeClr val="accent1"/>
-          </a:fillRef>
-          <a:effectRef idx="0">
-            <a:schemeClr val="accent1"/>
-          </a:effectRef>
-          <a:fontRef idx="minor">
-            <a:schemeClr val="lt1"/>
-          </a:fontRef>
-        </p:style>
-        <p:txBody>
-          <a:bodyPr rtlCol="0" anchor="ctr"/>
-          <a:lstStyle/>
-          <a:p>
-            <a:pPr algn="ctr"/>
             <a:endParaRPr lang="pt-BR" dirty="0"/>
           </a:p>
         </p:txBody>
       </p:sp>
-      <p:pic>
-        <p:nvPicPr>
-          <p:cNvPr id="7" name="Imagem 6">
-            <a:extLst>
-              <a:ext uri="{FF2B5EF4-FFF2-40B4-BE49-F238E27FC236}">
-                <a16:creationId xmlns:a16="http://schemas.microsoft.com/office/drawing/2014/main" id="{9702E9D9-FB62-100D-3078-D9716BC30710}"/>
-              </a:ext>
-            </a:extLst>
-          </p:cNvPr>
-          <p:cNvPicPr>
-            <a:picLocks noChangeAspect="1"/>
-          </p:cNvPicPr>
-          <p:nvPr/>
-        </p:nvPicPr>
-        <p:blipFill>
-          <a:blip r:embed="rId2">
-            <a:extLst>
-              <a:ext uri="{28A0092B-C50C-407E-A947-70E740481C1C}">
-                <a14:useLocalDpi xmlns:a14="http://schemas.microsoft.com/office/drawing/2010/main" val="0"/>
-              </a:ext>
-            </a:extLst>
-          </a:blip>
-          <a:stretch>
-            <a:fillRect/>
-          </a:stretch>
-        </p:blipFill>
-        <p:spPr>
-          <a:xfrm>
-            <a:off x="182654" y="0"/>
-            <a:ext cx="782368" cy="785611"/>
-          </a:xfrm>
-          <a:prstGeom prst="rect">
-            <a:avLst/>
-          </a:prstGeom>
-        </p:spPr>
-      </p:pic>
       <p:cxnSp>
         <p:nvCxnSpPr>
           <p:cNvPr id="9" name="Conector reto 8">
@@ -7989,12 +7958,61 @@
           </a:p>
         </p:txBody>
       </p:sp>
+      <p:sp>
+        <p:nvSpPr>
+          <p:cNvPr id="6" name="Retângulo 5">
+            <a:extLst>
+              <a:ext uri="{FF2B5EF4-FFF2-40B4-BE49-F238E27FC236}">
+                <a16:creationId xmlns:a16="http://schemas.microsoft.com/office/drawing/2014/main" id="{6B999BAA-79F4-5899-58D3-33EB3DC82F37}"/>
+              </a:ext>
+            </a:extLst>
+          </p:cNvPr>
+          <p:cNvSpPr/>
+          <p:nvPr/>
+        </p:nvSpPr>
+        <p:spPr>
+          <a:xfrm>
+            <a:off x="0" y="0"/>
+            <a:ext cx="12192000" cy="785611"/>
+          </a:xfrm>
+          <a:prstGeom prst="rect">
+            <a:avLst/>
+          </a:prstGeom>
+          <a:solidFill>
+            <a:schemeClr val="tx1"/>
+          </a:solidFill>
+        </p:spPr>
+        <p:style>
+          <a:lnRef idx="2">
+            <a:schemeClr val="accent1">
+              <a:shade val="15000"/>
+            </a:schemeClr>
+          </a:lnRef>
+          <a:fillRef idx="1">
+            <a:schemeClr val="accent1"/>
+          </a:fillRef>
+          <a:effectRef idx="0">
+            <a:schemeClr val="accent1"/>
+          </a:effectRef>
+          <a:fontRef idx="minor">
+            <a:schemeClr val="lt1"/>
+          </a:fontRef>
+        </p:style>
+        <p:txBody>
+          <a:bodyPr rtlCol="0" anchor="ctr"/>
+          <a:lstStyle/>
+          <a:p>
+            <a:pPr algn="ctr"/>
+            <a:endParaRPr lang="pt-BR"/>
+          </a:p>
+        </p:txBody>
+      </p:sp>
       <p:pic>
         <p:nvPicPr>
-          <p:cNvPr id="65" name="Imagem 64">
-            <a:extLst>
-              <a:ext uri="{FF2B5EF4-FFF2-40B4-BE49-F238E27FC236}">
-                <a16:creationId xmlns:a16="http://schemas.microsoft.com/office/drawing/2014/main" id="{BEE7DAC9-B008-C0EF-9BA0-FE1B43FD16FE}"/>
+          <p:cNvPr id="12" name="Imagem 11">
+            <a:extLst>
+              <a:ext uri="{FF2B5EF4-FFF2-40B4-BE49-F238E27FC236}">
+                <a16:creationId xmlns:a16="http://schemas.microsoft.com/office/drawing/2014/main" id="{3D82139B-E4A2-1D7D-61D1-8134D573E51F}"/>
               </a:ext>
             </a:extLst>
           </p:cNvPr>
@@ -8004,7 +8022,7 @@
           <p:nvPr/>
         </p:nvPicPr>
         <p:blipFill>
-          <a:blip r:embed="rId3">
+          <a:blip r:embed="rId2">
             <a:extLst>
               <a:ext uri="{28A0092B-C50C-407E-A947-70E740481C1C}">
                 <a14:useLocalDpi xmlns:a14="http://schemas.microsoft.com/office/drawing/2010/main" val="0"/>
@@ -8017,8 +8035,96 @@
         </p:blipFill>
         <p:spPr>
           <a:xfrm>
-            <a:off x="11503473" y="194460"/>
-            <a:ext cx="396689" cy="396689"/>
+            <a:off x="185719" y="156924"/>
+            <a:ext cx="2064702" cy="508209"/>
+          </a:xfrm>
+          <a:prstGeom prst="rect">
+            <a:avLst/>
+          </a:prstGeom>
+        </p:spPr>
+      </p:pic>
+      <p:sp>
+        <p:nvSpPr>
+          <p:cNvPr id="13" name="Elipse 12">
+            <a:extLst>
+              <a:ext uri="{FF2B5EF4-FFF2-40B4-BE49-F238E27FC236}">
+                <a16:creationId xmlns:a16="http://schemas.microsoft.com/office/drawing/2014/main" id="{A070612D-4E82-2085-1D8F-AA7C2496576E}"/>
+              </a:ext>
+            </a:extLst>
+          </p:cNvPr>
+          <p:cNvSpPr/>
+          <p:nvPr/>
+        </p:nvSpPr>
+        <p:spPr>
+          <a:xfrm>
+            <a:off x="11388372" y="102079"/>
+            <a:ext cx="590602" cy="590602"/>
+          </a:xfrm>
+          <a:prstGeom prst="ellipse">
+            <a:avLst/>
+          </a:prstGeom>
+          <a:solidFill>
+            <a:srgbClr val="DEA900"/>
+          </a:solidFill>
+          <a:ln>
+            <a:noFill/>
+          </a:ln>
+        </p:spPr>
+        <p:style>
+          <a:lnRef idx="2">
+            <a:schemeClr val="accent1">
+              <a:shade val="15000"/>
+            </a:schemeClr>
+          </a:lnRef>
+          <a:fillRef idx="1">
+            <a:schemeClr val="accent1"/>
+          </a:fillRef>
+          <a:effectRef idx="0">
+            <a:schemeClr val="accent1"/>
+          </a:effectRef>
+          <a:fontRef idx="minor">
+            <a:schemeClr val="lt1"/>
+          </a:fontRef>
+        </p:style>
+        <p:txBody>
+          <a:bodyPr rtlCol="0" anchor="ctr"/>
+          <a:lstStyle/>
+          <a:p>
+            <a:pPr algn="ctr"/>
+            <a:endParaRPr lang="pt-BR"/>
+          </a:p>
+        </p:txBody>
+      </p:sp>
+      <p:pic>
+        <p:nvPicPr>
+          <p:cNvPr id="14" name="Imagem 13">
+            <a:extLst>
+              <a:ext uri="{FF2B5EF4-FFF2-40B4-BE49-F238E27FC236}">
+                <a16:creationId xmlns:a16="http://schemas.microsoft.com/office/drawing/2014/main" id="{1713315D-9A15-43B3-7BFA-66F03B3D72F5}"/>
+              </a:ext>
+            </a:extLst>
+          </p:cNvPr>
+          <p:cNvPicPr>
+            <a:picLocks noChangeAspect="1"/>
+          </p:cNvPicPr>
+          <p:nvPr/>
+        </p:nvPicPr>
+        <p:blipFill>
+          <a:blip r:embed="rId3">
+            <a:extLst>
+              <a:ext uri="{28A0092B-C50C-407E-A947-70E740481C1C}">
+                <a14:useLocalDpi xmlns:a14="http://schemas.microsoft.com/office/drawing/2010/main" val="0"/>
+              </a:ext>
+            </a:extLst>
+          </a:blip>
+          <a:stretch>
+            <a:fillRect/>
+          </a:stretch>
+        </p:blipFill>
+        <p:spPr>
+          <a:xfrm>
+            <a:off x="11377877" y="228600"/>
+            <a:ext cx="611591" cy="340364"/>
           </a:xfrm>
           <a:prstGeom prst="rect">
             <a:avLst/>
@@ -8063,91 +8169,6 @@
           <a:chExt cx="0" cy="0"/>
         </a:xfrm>
       </p:grpSpPr>
-      <p:sp>
-        <p:nvSpPr>
-          <p:cNvPr id="4" name="Retângulo 3">
-            <a:extLst>
-              <a:ext uri="{FF2B5EF4-FFF2-40B4-BE49-F238E27FC236}">
-                <a16:creationId xmlns:a16="http://schemas.microsoft.com/office/drawing/2014/main" id="{26B3DDFB-6D47-0656-E57B-5D54E1578324}"/>
-              </a:ext>
-            </a:extLst>
-          </p:cNvPr>
-          <p:cNvSpPr/>
-          <p:nvPr/>
-        </p:nvSpPr>
-        <p:spPr>
-          <a:xfrm>
-            <a:off x="0" y="0"/>
-            <a:ext cx="12192000" cy="785611"/>
-          </a:xfrm>
-          <a:prstGeom prst="rect">
-            <a:avLst/>
-          </a:prstGeom>
-          <a:solidFill>
-            <a:schemeClr val="tx1"/>
-          </a:solidFill>
-        </p:spPr>
-        <p:style>
-          <a:lnRef idx="2">
-            <a:schemeClr val="accent1">
-              <a:shade val="15000"/>
-            </a:schemeClr>
-          </a:lnRef>
-          <a:fillRef idx="1">
-            <a:schemeClr val="accent1"/>
-          </a:fillRef>
-          <a:effectRef idx="0">
-            <a:schemeClr val="accent1"/>
-          </a:effectRef>
-          <a:fontRef idx="minor">
-            <a:schemeClr val="lt1"/>
-          </a:fontRef>
-        </p:style>
-        <p:txBody>
-          <a:bodyPr rtlCol="0" anchor="ctr"/>
-          <a:lstStyle/>
-          <a:p>
-            <a:pPr algn="ctr"/>
-            <a:endParaRPr lang="pt-BR"/>
-          </a:p>
-        </p:txBody>
-      </p:sp>
-      <p:pic>
-        <p:nvPicPr>
-          <p:cNvPr id="7" name="Imagem 6">
-            <a:extLst>
-              <a:ext uri="{FF2B5EF4-FFF2-40B4-BE49-F238E27FC236}">
-                <a16:creationId xmlns:a16="http://schemas.microsoft.com/office/drawing/2014/main" id="{9702E9D9-FB62-100D-3078-D9716BC30710}"/>
-              </a:ext>
-            </a:extLst>
-          </p:cNvPr>
-          <p:cNvPicPr>
-            <a:picLocks noChangeAspect="1"/>
-          </p:cNvPicPr>
-          <p:nvPr/>
-        </p:nvPicPr>
-        <p:blipFill>
-          <a:blip r:embed="rId2">
-            <a:extLst>
-              <a:ext uri="{28A0092B-C50C-407E-A947-70E740481C1C}">
-                <a14:useLocalDpi xmlns:a14="http://schemas.microsoft.com/office/drawing/2010/main" val="0"/>
-              </a:ext>
-            </a:extLst>
-          </a:blip>
-          <a:stretch>
-            <a:fillRect/>
-          </a:stretch>
-        </p:blipFill>
-        <p:spPr>
-          <a:xfrm>
-            <a:off x="182654" y="0"/>
-            <a:ext cx="782368" cy="785611"/>
-          </a:xfrm>
-          <a:prstGeom prst="rect">
-            <a:avLst/>
-          </a:prstGeom>
-        </p:spPr>
-      </p:pic>
       <p:cxnSp>
         <p:nvCxnSpPr>
           <p:cNvPr id="9" name="Conector reto 8">
@@ -9998,13 +10019,13 @@
           <p:nvPr/>
         </p:nvPicPr>
         <p:blipFill>
-          <a:blip r:embed="rId3">
+          <a:blip r:embed="rId2">
             <a:extLst>
               <a:ext uri="{28A0092B-C50C-407E-A947-70E740481C1C}">
                 <a14:useLocalDpi xmlns:a14="http://schemas.microsoft.com/office/drawing/2010/main" val="0"/>
               </a:ext>
               <a:ext uri="{96DAC541-7B7A-43D3-8B79-37D633B846F1}">
-                <asvg:svgBlip xmlns:asvg="http://schemas.microsoft.com/office/drawing/2016/SVG/main" r:embed="rId4"/>
+                <asvg:svgBlip xmlns:asvg="http://schemas.microsoft.com/office/drawing/2016/SVG/main" r:embed="rId3"/>
               </a:ext>
             </a:extLst>
           </a:blip>
@@ -10022,12 +10043,61 @@
           </a:prstGeom>
         </p:spPr>
       </p:pic>
+      <p:sp>
+        <p:nvSpPr>
+          <p:cNvPr id="5" name="Retângulo 4">
+            <a:extLst>
+              <a:ext uri="{FF2B5EF4-FFF2-40B4-BE49-F238E27FC236}">
+                <a16:creationId xmlns:a16="http://schemas.microsoft.com/office/drawing/2014/main" id="{29A3A846-0E8D-A5A5-489A-2F9E24886FF1}"/>
+              </a:ext>
+            </a:extLst>
+          </p:cNvPr>
+          <p:cNvSpPr/>
+          <p:nvPr/>
+        </p:nvSpPr>
+        <p:spPr>
+          <a:xfrm>
+            <a:off x="0" y="0"/>
+            <a:ext cx="12192000" cy="785611"/>
+          </a:xfrm>
+          <a:prstGeom prst="rect">
+            <a:avLst/>
+          </a:prstGeom>
+          <a:solidFill>
+            <a:schemeClr val="tx1"/>
+          </a:solidFill>
+        </p:spPr>
+        <p:style>
+          <a:lnRef idx="2">
+            <a:schemeClr val="accent1">
+              <a:shade val="15000"/>
+            </a:schemeClr>
+          </a:lnRef>
+          <a:fillRef idx="1">
+            <a:schemeClr val="accent1"/>
+          </a:fillRef>
+          <a:effectRef idx="0">
+            <a:schemeClr val="accent1"/>
+          </a:effectRef>
+          <a:fontRef idx="minor">
+            <a:schemeClr val="lt1"/>
+          </a:fontRef>
+        </p:style>
+        <p:txBody>
+          <a:bodyPr rtlCol="0" anchor="ctr"/>
+          <a:lstStyle/>
+          <a:p>
+            <a:pPr algn="ctr"/>
+            <a:endParaRPr lang="pt-BR"/>
+          </a:p>
+        </p:txBody>
+      </p:sp>
       <p:pic>
         <p:nvPicPr>
-          <p:cNvPr id="89" name="Imagem 88">
-            <a:extLst>
-              <a:ext uri="{FF2B5EF4-FFF2-40B4-BE49-F238E27FC236}">
-                <a16:creationId xmlns:a16="http://schemas.microsoft.com/office/drawing/2014/main" id="{CAE9EE8E-D03C-E341-67FD-1DC7A90B453C}"/>
+          <p:cNvPr id="6" name="Imagem 5">
+            <a:extLst>
+              <a:ext uri="{FF2B5EF4-FFF2-40B4-BE49-F238E27FC236}">
+                <a16:creationId xmlns:a16="http://schemas.microsoft.com/office/drawing/2014/main" id="{A5CAA358-5644-481D-1F05-FEAF503E1E86}"/>
               </a:ext>
             </a:extLst>
           </p:cNvPr>
@@ -10037,7 +10107,7 @@
           <p:nvPr/>
         </p:nvPicPr>
         <p:blipFill>
-          <a:blip r:embed="rId5">
+          <a:blip r:embed="rId4">
             <a:extLst>
               <a:ext uri="{28A0092B-C50C-407E-A947-70E740481C1C}">
                 <a14:useLocalDpi xmlns:a14="http://schemas.microsoft.com/office/drawing/2010/main" val="0"/>
@@ -10050,8 +10120,96 @@
         </p:blipFill>
         <p:spPr>
           <a:xfrm>
-            <a:off x="11503473" y="194460"/>
-            <a:ext cx="396689" cy="396689"/>
+            <a:off x="185719" y="156924"/>
+            <a:ext cx="2064702" cy="508209"/>
+          </a:xfrm>
+          <a:prstGeom prst="rect">
+            <a:avLst/>
+          </a:prstGeom>
+        </p:spPr>
+      </p:pic>
+      <p:sp>
+        <p:nvSpPr>
+          <p:cNvPr id="8" name="Elipse 7">
+            <a:extLst>
+              <a:ext uri="{FF2B5EF4-FFF2-40B4-BE49-F238E27FC236}">
+                <a16:creationId xmlns:a16="http://schemas.microsoft.com/office/drawing/2014/main" id="{D2AA55B8-39BC-63DB-AF79-3158B30BFF42}"/>
+              </a:ext>
+            </a:extLst>
+          </p:cNvPr>
+          <p:cNvSpPr/>
+          <p:nvPr/>
+        </p:nvSpPr>
+        <p:spPr>
+          <a:xfrm>
+            <a:off x="11388372" y="102079"/>
+            <a:ext cx="590602" cy="590602"/>
+          </a:xfrm>
+          <a:prstGeom prst="ellipse">
+            <a:avLst/>
+          </a:prstGeom>
+          <a:solidFill>
+            <a:srgbClr val="DEA900"/>
+          </a:solidFill>
+          <a:ln>
+            <a:noFill/>
+          </a:ln>
+        </p:spPr>
+        <p:style>
+          <a:lnRef idx="2">
+            <a:schemeClr val="accent1">
+              <a:shade val="15000"/>
+            </a:schemeClr>
+          </a:lnRef>
+          <a:fillRef idx="1">
+            <a:schemeClr val="accent1"/>
+          </a:fillRef>
+          <a:effectRef idx="0">
+            <a:schemeClr val="accent1"/>
+          </a:effectRef>
+          <a:fontRef idx="minor">
+            <a:schemeClr val="lt1"/>
+          </a:fontRef>
+        </p:style>
+        <p:txBody>
+          <a:bodyPr rtlCol="0" anchor="ctr"/>
+          <a:lstStyle/>
+          <a:p>
+            <a:pPr algn="ctr"/>
+            <a:endParaRPr lang="pt-BR"/>
+          </a:p>
+        </p:txBody>
+      </p:sp>
+      <p:pic>
+        <p:nvPicPr>
+          <p:cNvPr id="11" name="Imagem 10">
+            <a:extLst>
+              <a:ext uri="{FF2B5EF4-FFF2-40B4-BE49-F238E27FC236}">
+                <a16:creationId xmlns:a16="http://schemas.microsoft.com/office/drawing/2014/main" id="{0202EF38-EFCF-21D5-F5A8-8ECFDEBB0866}"/>
+              </a:ext>
+            </a:extLst>
+          </p:cNvPr>
+          <p:cNvPicPr>
+            <a:picLocks noChangeAspect="1"/>
+          </p:cNvPicPr>
+          <p:nvPr/>
+        </p:nvPicPr>
+        <p:blipFill>
+          <a:blip r:embed="rId5">
+            <a:extLst>
+              <a:ext uri="{28A0092B-C50C-407E-A947-70E740481C1C}">
+                <a14:useLocalDpi xmlns:a14="http://schemas.microsoft.com/office/drawing/2010/main" val="0"/>
+              </a:ext>
+            </a:extLst>
+          </a:blip>
+          <a:stretch>
+            <a:fillRect/>
+          </a:stretch>
+        </p:blipFill>
+        <p:spPr>
+          <a:xfrm>
+            <a:off x="11377877" y="228600"/>
+            <a:ext cx="611591" cy="340364"/>
           </a:xfrm>
           <a:prstGeom prst="rect">
             <a:avLst/>
@@ -10098,10 +10256,10 @@
       </p:grpSpPr>
       <p:sp>
         <p:nvSpPr>
-          <p:cNvPr id="4" name="Retângulo 3">
-            <a:extLst>
-              <a:ext uri="{FF2B5EF4-FFF2-40B4-BE49-F238E27FC236}">
-                <a16:creationId xmlns:a16="http://schemas.microsoft.com/office/drawing/2014/main" id="{26B3DDFB-6D47-0656-E57B-5D54E1578324}"/>
+          <p:cNvPr id="5" name="Retângulo: Cantos Arredondados 4">
+            <a:extLst>
+              <a:ext uri="{FF2B5EF4-FFF2-40B4-BE49-F238E27FC236}">
+                <a16:creationId xmlns:a16="http://schemas.microsoft.com/office/drawing/2014/main" id="{21600A88-5FBB-9B8C-1536-59181C8ECD63}"/>
               </a:ext>
             </a:extLst>
           </p:cNvPr>
@@ -10110,15 +10268,20 @@
         </p:nvSpPr>
         <p:spPr>
           <a:xfrm>
-            <a:off x="0" y="0"/>
-            <a:ext cx="12192000" cy="785611"/>
-          </a:xfrm>
-          <a:prstGeom prst="rect">
-            <a:avLst/>
+            <a:off x="717997" y="1722137"/>
+            <a:ext cx="10756006" cy="4692312"/>
+          </a:xfrm>
+          <a:prstGeom prst="roundRect">
+            <a:avLst>
+              <a:gd name="adj" fmla="val 2855"/>
+            </a:avLst>
           </a:prstGeom>
           <a:solidFill>
-            <a:schemeClr val="tx1"/>
+            <a:schemeClr val="bg1"/>
           </a:solidFill>
+          <a:ln>
+            <a:noFill/>
+          </a:ln>
         </p:spPr>
         <p:style>
           <a:lnRef idx="2">
@@ -10145,96 +10308,6 @@
           </a:p>
         </p:txBody>
       </p:sp>
-      <p:sp>
-        <p:nvSpPr>
-          <p:cNvPr id="5" name="Retângulo: Cantos Arredondados 4">
-            <a:extLst>
-              <a:ext uri="{FF2B5EF4-FFF2-40B4-BE49-F238E27FC236}">
-                <a16:creationId xmlns:a16="http://schemas.microsoft.com/office/drawing/2014/main" id="{21600A88-5FBB-9B8C-1536-59181C8ECD63}"/>
-              </a:ext>
-            </a:extLst>
-          </p:cNvPr>
-          <p:cNvSpPr/>
-          <p:nvPr/>
-        </p:nvSpPr>
-        <p:spPr>
-          <a:xfrm>
-            <a:off x="717997" y="1722137"/>
-            <a:ext cx="10756006" cy="4692312"/>
-          </a:xfrm>
-          <a:prstGeom prst="roundRect">
-            <a:avLst>
-              <a:gd name="adj" fmla="val 2855"/>
-            </a:avLst>
-          </a:prstGeom>
-          <a:solidFill>
-            <a:schemeClr val="bg1"/>
-          </a:solidFill>
-          <a:ln>
-            <a:noFill/>
-          </a:ln>
-        </p:spPr>
-        <p:style>
-          <a:lnRef idx="2">
-            <a:schemeClr val="accent1">
-              <a:shade val="15000"/>
-            </a:schemeClr>
-          </a:lnRef>
-          <a:fillRef idx="1">
-            <a:schemeClr val="accent1"/>
-          </a:fillRef>
-          <a:effectRef idx="0">
-            <a:schemeClr val="accent1"/>
-          </a:effectRef>
-          <a:fontRef idx="minor">
-            <a:schemeClr val="lt1"/>
-          </a:fontRef>
-        </p:style>
-        <p:txBody>
-          <a:bodyPr rtlCol="0" anchor="ctr"/>
-          <a:lstStyle/>
-          <a:p>
-            <a:pPr algn="ctr"/>
-            <a:endParaRPr lang="pt-BR"/>
-          </a:p>
-        </p:txBody>
-      </p:sp>
-      <p:pic>
-        <p:nvPicPr>
-          <p:cNvPr id="7" name="Imagem 6">
-            <a:extLst>
-              <a:ext uri="{FF2B5EF4-FFF2-40B4-BE49-F238E27FC236}">
-                <a16:creationId xmlns:a16="http://schemas.microsoft.com/office/drawing/2014/main" id="{9702E9D9-FB62-100D-3078-D9716BC30710}"/>
-              </a:ext>
-            </a:extLst>
-          </p:cNvPr>
-          <p:cNvPicPr>
-            <a:picLocks noChangeAspect="1"/>
-          </p:cNvPicPr>
-          <p:nvPr/>
-        </p:nvPicPr>
-        <p:blipFill>
-          <a:blip r:embed="rId2">
-            <a:extLst>
-              <a:ext uri="{28A0092B-C50C-407E-A947-70E740481C1C}">
-                <a14:useLocalDpi xmlns:a14="http://schemas.microsoft.com/office/drawing/2010/main" val="0"/>
-              </a:ext>
-            </a:extLst>
-          </a:blip>
-          <a:stretch>
-            <a:fillRect/>
-          </a:stretch>
-        </p:blipFill>
-        <p:spPr>
-          <a:xfrm>
-            <a:off x="182654" y="0"/>
-            <a:ext cx="782368" cy="785611"/>
-          </a:xfrm>
-          <a:prstGeom prst="rect">
-            <a:avLst/>
-          </a:prstGeom>
-        </p:spPr>
-      </p:pic>
       <p:sp>
         <p:nvSpPr>
           <p:cNvPr id="13" name="CaixaDeTexto 12">
@@ -10524,12 +10597,61 @@
           </a:p>
         </p:txBody>
       </p:sp>
+      <p:sp>
+        <p:nvSpPr>
+          <p:cNvPr id="17" name="Retângulo 16">
+            <a:extLst>
+              <a:ext uri="{FF2B5EF4-FFF2-40B4-BE49-F238E27FC236}">
+                <a16:creationId xmlns:a16="http://schemas.microsoft.com/office/drawing/2014/main" id="{B5BBD697-1DED-35D2-142F-0F37509D3752}"/>
+              </a:ext>
+            </a:extLst>
+          </p:cNvPr>
+          <p:cNvSpPr/>
+          <p:nvPr/>
+        </p:nvSpPr>
+        <p:spPr>
+          <a:xfrm>
+            <a:off x="0" y="0"/>
+            <a:ext cx="12192000" cy="785611"/>
+          </a:xfrm>
+          <a:prstGeom prst="rect">
+            <a:avLst/>
+          </a:prstGeom>
+          <a:solidFill>
+            <a:schemeClr val="tx1"/>
+          </a:solidFill>
+        </p:spPr>
+        <p:style>
+          <a:lnRef idx="2">
+            <a:schemeClr val="accent1">
+              <a:shade val="15000"/>
+            </a:schemeClr>
+          </a:lnRef>
+          <a:fillRef idx="1">
+            <a:schemeClr val="accent1"/>
+          </a:fillRef>
+          <a:effectRef idx="0">
+            <a:schemeClr val="accent1"/>
+          </a:effectRef>
+          <a:fontRef idx="minor">
+            <a:schemeClr val="lt1"/>
+          </a:fontRef>
+        </p:style>
+        <p:txBody>
+          <a:bodyPr rtlCol="0" anchor="ctr"/>
+          <a:lstStyle/>
+          <a:p>
+            <a:pPr algn="ctr"/>
+            <a:endParaRPr lang="pt-BR"/>
+          </a:p>
+        </p:txBody>
+      </p:sp>
       <p:pic>
         <p:nvPicPr>
-          <p:cNvPr id="14" name="Imagem 13">
-            <a:extLst>
-              <a:ext uri="{FF2B5EF4-FFF2-40B4-BE49-F238E27FC236}">
-                <a16:creationId xmlns:a16="http://schemas.microsoft.com/office/drawing/2014/main" id="{CEBA42CB-C73E-A707-FB9D-1FF41803608D}"/>
+          <p:cNvPr id="18" name="Imagem 17">
+            <a:extLst>
+              <a:ext uri="{FF2B5EF4-FFF2-40B4-BE49-F238E27FC236}">
+                <a16:creationId xmlns:a16="http://schemas.microsoft.com/office/drawing/2014/main" id="{72ABBFD9-C099-2305-5E5B-253224928404}"/>
               </a:ext>
             </a:extLst>
           </p:cNvPr>
@@ -10539,7 +10661,7 @@
           <p:nvPr/>
         </p:nvPicPr>
         <p:blipFill>
-          <a:blip r:embed="rId3">
+          <a:blip r:embed="rId2">
             <a:extLst>
               <a:ext uri="{28A0092B-C50C-407E-A947-70E740481C1C}">
                 <a14:useLocalDpi xmlns:a14="http://schemas.microsoft.com/office/drawing/2010/main" val="0"/>
@@ -10552,8 +10674,96 @@
         </p:blipFill>
         <p:spPr>
           <a:xfrm>
-            <a:off x="11503473" y="194460"/>
-            <a:ext cx="396689" cy="396689"/>
+            <a:off x="185719" y="156924"/>
+            <a:ext cx="2064702" cy="508209"/>
+          </a:xfrm>
+          <a:prstGeom prst="rect">
+            <a:avLst/>
+          </a:prstGeom>
+        </p:spPr>
+      </p:pic>
+      <p:sp>
+        <p:nvSpPr>
+          <p:cNvPr id="19" name="Elipse 18">
+            <a:extLst>
+              <a:ext uri="{FF2B5EF4-FFF2-40B4-BE49-F238E27FC236}">
+                <a16:creationId xmlns:a16="http://schemas.microsoft.com/office/drawing/2014/main" id="{79729C71-53CC-2DD3-AA45-1FA07EEA1445}"/>
+              </a:ext>
+            </a:extLst>
+          </p:cNvPr>
+          <p:cNvSpPr/>
+          <p:nvPr/>
+        </p:nvSpPr>
+        <p:spPr>
+          <a:xfrm>
+            <a:off x="11388372" y="102079"/>
+            <a:ext cx="590602" cy="590602"/>
+          </a:xfrm>
+          <a:prstGeom prst="ellipse">
+            <a:avLst/>
+          </a:prstGeom>
+          <a:solidFill>
+            <a:srgbClr val="DEA900"/>
+          </a:solidFill>
+          <a:ln>
+            <a:noFill/>
+          </a:ln>
+        </p:spPr>
+        <p:style>
+          <a:lnRef idx="2">
+            <a:schemeClr val="accent1">
+              <a:shade val="15000"/>
+            </a:schemeClr>
+          </a:lnRef>
+          <a:fillRef idx="1">
+            <a:schemeClr val="accent1"/>
+          </a:fillRef>
+          <a:effectRef idx="0">
+            <a:schemeClr val="accent1"/>
+          </a:effectRef>
+          <a:fontRef idx="minor">
+            <a:schemeClr val="lt1"/>
+          </a:fontRef>
+        </p:style>
+        <p:txBody>
+          <a:bodyPr rtlCol="0" anchor="ctr"/>
+          <a:lstStyle/>
+          <a:p>
+            <a:pPr algn="ctr"/>
+            <a:endParaRPr lang="pt-BR"/>
+          </a:p>
+        </p:txBody>
+      </p:sp>
+      <p:pic>
+        <p:nvPicPr>
+          <p:cNvPr id="20" name="Imagem 19">
+            <a:extLst>
+              <a:ext uri="{FF2B5EF4-FFF2-40B4-BE49-F238E27FC236}">
+                <a16:creationId xmlns:a16="http://schemas.microsoft.com/office/drawing/2014/main" id="{19C5F41F-59B6-D4E1-A618-209232CD336B}"/>
+              </a:ext>
+            </a:extLst>
+          </p:cNvPr>
+          <p:cNvPicPr>
+            <a:picLocks noChangeAspect="1"/>
+          </p:cNvPicPr>
+          <p:nvPr/>
+        </p:nvPicPr>
+        <p:blipFill>
+          <a:blip r:embed="rId3">
+            <a:extLst>
+              <a:ext uri="{28A0092B-C50C-407E-A947-70E740481C1C}">
+                <a14:useLocalDpi xmlns:a14="http://schemas.microsoft.com/office/drawing/2010/main" val="0"/>
+              </a:ext>
+            </a:extLst>
+          </a:blip>
+          <a:stretch>
+            <a:fillRect/>
+          </a:stretch>
+        </p:blipFill>
+        <p:spPr>
+          <a:xfrm>
+            <a:off x="11377877" y="228600"/>
+            <a:ext cx="611591" cy="340364"/>
           </a:xfrm>
           <a:prstGeom prst="rect">
             <a:avLst/>
@@ -10600,10 +10810,255 @@
       </p:grpSpPr>
       <p:sp>
         <p:nvSpPr>
-          <p:cNvPr id="48" name="Retângulo: Cantos Arredondados 47">
-            <a:extLst>
-              <a:ext uri="{FF2B5EF4-FFF2-40B4-BE49-F238E27FC236}">
-                <a16:creationId xmlns:a16="http://schemas.microsoft.com/office/drawing/2014/main" id="{4F872EB0-DAA6-2500-E4B5-1BF47D675FB6}"/>
+          <p:cNvPr id="11" name="CaixaDeTexto 10">
+            <a:extLst>
+              <a:ext uri="{FF2B5EF4-FFF2-40B4-BE49-F238E27FC236}">
+                <a16:creationId xmlns:a16="http://schemas.microsoft.com/office/drawing/2014/main" id="{DBEFC525-6F64-76E2-C98A-DA22D7B39FBB}"/>
+              </a:ext>
+            </a:extLst>
+          </p:cNvPr>
+          <p:cNvSpPr txBox="1"/>
+          <p:nvPr/>
+        </p:nvSpPr>
+        <p:spPr>
+          <a:xfrm>
+            <a:off x="10791713" y="6384477"/>
+            <a:ext cx="786396" cy="461665"/>
+          </a:xfrm>
+          <a:prstGeom prst="rect">
+            <a:avLst/>
+          </a:prstGeom>
+          <a:noFill/>
+        </p:spPr>
+        <p:txBody>
+          <a:bodyPr wrap="square" rtlCol="0">
+            <a:spAutoFit/>
+          </a:bodyPr>
+          <a:lstStyle/>
+          <a:p>
+            <a:r>
+              <a:rPr lang="pt-BR" sz="2400" b="1" dirty="0"/>
+              <a:t>&lt;</a:t>
+            </a:r>
+            <a:r>
+              <a:rPr lang="pt-BR" sz="2400" dirty="0"/>
+              <a:t>    </a:t>
+            </a:r>
+            <a:r>
+              <a:rPr lang="pt-BR" sz="2400" b="1" dirty="0">
+                <a:solidFill>
+                  <a:srgbClr val="DEA900"/>
+                </a:solidFill>
+              </a:rPr>
+              <a:t>&gt;</a:t>
+            </a:r>
+          </a:p>
+        </p:txBody>
+      </p:sp>
+      <p:cxnSp>
+        <p:nvCxnSpPr>
+          <p:cNvPr id="7" name="Conector reto 6">
+            <a:extLst>
+              <a:ext uri="{FF2B5EF4-FFF2-40B4-BE49-F238E27FC236}">
+                <a16:creationId xmlns:a16="http://schemas.microsoft.com/office/drawing/2014/main" id="{9345BF61-A08E-6E3E-35CB-B1B28AD9D0CC}"/>
+              </a:ext>
+            </a:extLst>
+          </p:cNvPr>
+          <p:cNvCxnSpPr/>
+          <p:nvPr/>
+        </p:nvCxnSpPr>
+        <p:spPr>
+          <a:xfrm>
+            <a:off x="717997" y="1503664"/>
+            <a:ext cx="10756006" cy="0"/>
+          </a:xfrm>
+          <a:prstGeom prst="line">
+            <a:avLst/>
+          </a:prstGeom>
+          <a:ln w="44450"/>
+        </p:spPr>
+        <p:style>
+          <a:lnRef idx="3">
+            <a:schemeClr val="accent3"/>
+          </a:lnRef>
+          <a:fillRef idx="0">
+            <a:schemeClr val="accent3"/>
+          </a:fillRef>
+          <a:effectRef idx="2">
+            <a:schemeClr val="accent3"/>
+          </a:effectRef>
+          <a:fontRef idx="minor">
+            <a:schemeClr val="tx1"/>
+          </a:fontRef>
+        </p:style>
+      </p:cxnSp>
+      <p:cxnSp>
+        <p:nvCxnSpPr>
+          <p:cNvPr id="10" name="Conector reto 9">
+            <a:extLst>
+              <a:ext uri="{FF2B5EF4-FFF2-40B4-BE49-F238E27FC236}">
+                <a16:creationId xmlns:a16="http://schemas.microsoft.com/office/drawing/2014/main" id="{381B36E3-0245-4AB2-C599-236F7D243612}"/>
+              </a:ext>
+            </a:extLst>
+          </p:cNvPr>
+          <p:cNvCxnSpPr>
+            <a:cxnSpLocks/>
+          </p:cNvCxnSpPr>
+          <p:nvPr/>
+        </p:nvCxnSpPr>
+        <p:spPr>
+          <a:xfrm>
+            <a:off x="718145" y="1504670"/>
+            <a:ext cx="5077892" cy="0"/>
+          </a:xfrm>
+          <a:prstGeom prst="line">
+            <a:avLst/>
+          </a:prstGeom>
+          <a:ln w="44450">
+            <a:solidFill>
+              <a:srgbClr val="DEA900"/>
+            </a:solidFill>
+          </a:ln>
+        </p:spPr>
+        <p:style>
+          <a:lnRef idx="3">
+            <a:schemeClr val="accent4"/>
+          </a:lnRef>
+          <a:fillRef idx="0">
+            <a:schemeClr val="accent4"/>
+          </a:fillRef>
+          <a:effectRef idx="2">
+            <a:schemeClr val="accent4"/>
+          </a:effectRef>
+          <a:fontRef idx="minor">
+            <a:schemeClr val="tx1"/>
+          </a:fontRef>
+        </p:style>
+      </p:cxnSp>
+      <p:sp>
+        <p:nvSpPr>
+          <p:cNvPr id="12" name="CaixaDeTexto 11">
+            <a:extLst>
+              <a:ext uri="{FF2B5EF4-FFF2-40B4-BE49-F238E27FC236}">
+                <a16:creationId xmlns:a16="http://schemas.microsoft.com/office/drawing/2014/main" id="{ABDE748F-D0BC-966E-891E-9470BBA30A28}"/>
+              </a:ext>
+            </a:extLst>
+          </p:cNvPr>
+          <p:cNvSpPr txBox="1"/>
+          <p:nvPr/>
+        </p:nvSpPr>
+        <p:spPr>
+          <a:xfrm>
+            <a:off x="6914410" y="980676"/>
+            <a:ext cx="3740743" cy="400110"/>
+          </a:xfrm>
+          <a:prstGeom prst="rect">
+            <a:avLst/>
+          </a:prstGeom>
+          <a:noFill/>
+        </p:spPr>
+        <p:txBody>
+          <a:bodyPr wrap="square" rtlCol="0">
+            <a:spAutoFit/>
+          </a:bodyPr>
+          <a:lstStyle/>
+          <a:p>
+            <a:r>
+              <a:rPr lang="pt-BR" sz="2000" b="1" dirty="0">
+                <a:solidFill>
+                  <a:schemeClr val="bg2">
+                    <a:lumMod val="90000"/>
+                  </a:schemeClr>
+                </a:solidFill>
+                <a:latin typeface="Raleway" panose="020B0003030101060003" pitchFamily="34" charset="0"/>
+              </a:rPr>
+              <a:t>DIAGRAMA DE CASO DE USO</a:t>
+            </a:r>
+          </a:p>
+        </p:txBody>
+      </p:sp>
+      <p:sp>
+        <p:nvSpPr>
+          <p:cNvPr id="15" name="CaixaDeTexto 14">
+            <a:extLst>
+              <a:ext uri="{FF2B5EF4-FFF2-40B4-BE49-F238E27FC236}">
+                <a16:creationId xmlns:a16="http://schemas.microsoft.com/office/drawing/2014/main" id="{FDDA34A9-D05F-2369-560C-87724F301FFE}"/>
+              </a:ext>
+            </a:extLst>
+          </p:cNvPr>
+          <p:cNvSpPr txBox="1"/>
+          <p:nvPr/>
+        </p:nvSpPr>
+        <p:spPr>
+          <a:xfrm>
+            <a:off x="1427663" y="980676"/>
+            <a:ext cx="3740743" cy="400110"/>
+          </a:xfrm>
+          <a:prstGeom prst="rect">
+            <a:avLst/>
+          </a:prstGeom>
+          <a:noFill/>
+        </p:spPr>
+        <p:txBody>
+          <a:bodyPr wrap="square" rtlCol="0">
+            <a:spAutoFit/>
+          </a:bodyPr>
+          <a:lstStyle/>
+          <a:p>
+            <a:r>
+              <a:rPr lang="pt-BR" sz="2000" b="1" dirty="0">
+                <a:solidFill>
+                  <a:srgbClr val="DEA900"/>
+                </a:solidFill>
+                <a:latin typeface="Raleway" panose="020B0003030101060003" pitchFamily="34" charset="0"/>
+              </a:rPr>
+              <a:t>PROJECT MODEL CANVAS</a:t>
+            </a:r>
+          </a:p>
+        </p:txBody>
+      </p:sp>
+      <p:pic>
+        <p:nvPicPr>
+          <p:cNvPr id="17" name="Imagem 16">
+            <a:extLst>
+              <a:ext uri="{FF2B5EF4-FFF2-40B4-BE49-F238E27FC236}">
+                <a16:creationId xmlns:a16="http://schemas.microsoft.com/office/drawing/2014/main" id="{0A39C36C-26CE-7098-ED01-60ADCD44295E}"/>
+              </a:ext>
+            </a:extLst>
+          </p:cNvPr>
+          <p:cNvPicPr>
+            <a:picLocks noChangeAspect="1"/>
+          </p:cNvPicPr>
+          <p:nvPr/>
+        </p:nvPicPr>
+        <p:blipFill>
+          <a:blip r:embed="rId2">
+            <a:extLst>
+              <a:ext uri="{28A0092B-C50C-407E-A947-70E740481C1C}">
+                <a14:useLocalDpi xmlns:a14="http://schemas.microsoft.com/office/drawing/2010/main" val="0"/>
+              </a:ext>
+            </a:extLst>
+          </a:blip>
+          <a:stretch>
+            <a:fillRect/>
+          </a:stretch>
+        </p:blipFill>
+        <p:spPr>
+          <a:xfrm>
+            <a:off x="2799600" y="1817674"/>
+            <a:ext cx="6592799" cy="4662340"/>
+          </a:xfrm>
+          <a:prstGeom prst="rect">
+            <a:avLst/>
+          </a:prstGeom>
+        </p:spPr>
+      </p:pic>
+      <p:sp>
+        <p:nvSpPr>
+          <p:cNvPr id="22" name="Retângulo 21">
+            <a:extLst>
+              <a:ext uri="{FF2B5EF4-FFF2-40B4-BE49-F238E27FC236}">
+                <a16:creationId xmlns:a16="http://schemas.microsoft.com/office/drawing/2014/main" id="{D11F88D1-6183-EA13-C199-5D2753FBA57B}"/>
               </a:ext>
             </a:extLst>
           </p:cNvPr>
@@ -10612,20 +11067,15 @@
         </p:nvSpPr>
         <p:spPr>
           <a:xfrm>
-            <a:off x="717997" y="5103009"/>
-            <a:ext cx="10756006" cy="803704"/>
-          </a:xfrm>
-          <a:prstGeom prst="roundRect">
-            <a:avLst>
-              <a:gd name="adj" fmla="val 9647"/>
-            </a:avLst>
+            <a:off x="0" y="0"/>
+            <a:ext cx="12192000" cy="785611"/>
+          </a:xfrm>
+          <a:prstGeom prst="rect">
+            <a:avLst/>
           </a:prstGeom>
           <a:solidFill>
-            <a:schemeClr val="bg1"/>
+            <a:schemeClr val="tx1"/>
           </a:solidFill>
-          <a:ln>
-            <a:noFill/>
-          </a:ln>
         </p:spPr>
         <p:style>
           <a:lnRef idx="2">
@@ -10652,12 +11102,48 @@
           </a:p>
         </p:txBody>
       </p:sp>
-      <p:sp>
-        <p:nvSpPr>
-          <p:cNvPr id="4" name="Retângulo 3">
-            <a:extLst>
-              <a:ext uri="{FF2B5EF4-FFF2-40B4-BE49-F238E27FC236}">
-                <a16:creationId xmlns:a16="http://schemas.microsoft.com/office/drawing/2014/main" id="{26B3DDFB-6D47-0656-E57B-5D54E1578324}"/>
+      <p:pic>
+        <p:nvPicPr>
+          <p:cNvPr id="23" name="Imagem 22">
+            <a:extLst>
+              <a:ext uri="{FF2B5EF4-FFF2-40B4-BE49-F238E27FC236}">
+                <a16:creationId xmlns:a16="http://schemas.microsoft.com/office/drawing/2014/main" id="{8A55F6E2-B43D-8A19-C273-7A768F6A6425}"/>
+              </a:ext>
+            </a:extLst>
+          </p:cNvPr>
+          <p:cNvPicPr>
+            <a:picLocks noChangeAspect="1"/>
+          </p:cNvPicPr>
+          <p:nvPr/>
+        </p:nvPicPr>
+        <p:blipFill>
+          <a:blip r:embed="rId3">
+            <a:extLst>
+              <a:ext uri="{28A0092B-C50C-407E-A947-70E740481C1C}">
+                <a14:useLocalDpi xmlns:a14="http://schemas.microsoft.com/office/drawing/2010/main" val="0"/>
+              </a:ext>
+            </a:extLst>
+          </a:blip>
+          <a:stretch>
+            <a:fillRect/>
+          </a:stretch>
+        </p:blipFill>
+        <p:spPr>
+          <a:xfrm>
+            <a:off x="185719" y="156924"/>
+            <a:ext cx="2064702" cy="508209"/>
+          </a:xfrm>
+          <a:prstGeom prst="rect">
+            <a:avLst/>
+          </a:prstGeom>
+        </p:spPr>
+      </p:pic>
+      <p:sp>
+        <p:nvSpPr>
+          <p:cNvPr id="24" name="Elipse 23">
+            <a:extLst>
+              <a:ext uri="{FF2B5EF4-FFF2-40B4-BE49-F238E27FC236}">
+                <a16:creationId xmlns:a16="http://schemas.microsoft.com/office/drawing/2014/main" id="{1E877CA3-72DA-D586-207C-8C8F3A765E88}"/>
               </a:ext>
             </a:extLst>
           </p:cNvPr>
@@ -10666,15 +11152,18 @@
         </p:nvSpPr>
         <p:spPr>
           <a:xfrm>
-            <a:off x="0" y="0"/>
-            <a:ext cx="12192000" cy="785611"/>
-          </a:xfrm>
-          <a:prstGeom prst="rect">
+            <a:off x="11388372" y="102079"/>
+            <a:ext cx="590602" cy="590602"/>
+          </a:xfrm>
+          <a:prstGeom prst="ellipse">
             <a:avLst/>
           </a:prstGeom>
           <a:solidFill>
-            <a:schemeClr val="tx1"/>
+            <a:srgbClr val="DEA900"/>
           </a:solidFill>
+          <a:ln>
+            <a:noFill/>
+          </a:ln>
         </p:spPr>
         <p:style>
           <a:lnRef idx="2">
@@ -10701,12 +11190,331 @@
           </a:p>
         </p:txBody>
       </p:sp>
-      <p:sp>
-        <p:nvSpPr>
-          <p:cNvPr id="5" name="Retângulo: Cantos Arredondados 4">
-            <a:extLst>
-              <a:ext uri="{FF2B5EF4-FFF2-40B4-BE49-F238E27FC236}">
-                <a16:creationId xmlns:a16="http://schemas.microsoft.com/office/drawing/2014/main" id="{21600A88-5FBB-9B8C-1536-59181C8ECD63}"/>
+      <p:pic>
+        <p:nvPicPr>
+          <p:cNvPr id="25" name="Imagem 24">
+            <a:extLst>
+              <a:ext uri="{FF2B5EF4-FFF2-40B4-BE49-F238E27FC236}">
+                <a16:creationId xmlns:a16="http://schemas.microsoft.com/office/drawing/2014/main" id="{92D91ACB-E4CD-27C1-7170-02DA2C8558D6}"/>
+              </a:ext>
+            </a:extLst>
+          </p:cNvPr>
+          <p:cNvPicPr>
+            <a:picLocks noChangeAspect="1"/>
+          </p:cNvPicPr>
+          <p:nvPr/>
+        </p:nvPicPr>
+        <p:blipFill>
+          <a:blip r:embed="rId4">
+            <a:extLst>
+              <a:ext uri="{28A0092B-C50C-407E-A947-70E740481C1C}">
+                <a14:useLocalDpi xmlns:a14="http://schemas.microsoft.com/office/drawing/2010/main" val="0"/>
+              </a:ext>
+            </a:extLst>
+          </a:blip>
+          <a:stretch>
+            <a:fillRect/>
+          </a:stretch>
+        </p:blipFill>
+        <p:spPr>
+          <a:xfrm>
+            <a:off x="11377877" y="228600"/>
+            <a:ext cx="611591" cy="340364"/>
+          </a:xfrm>
+          <a:prstGeom prst="rect">
+            <a:avLst/>
+          </a:prstGeom>
+        </p:spPr>
+      </p:pic>
+    </p:spTree>
+    <p:extLst>
+      <p:ext uri="{BB962C8B-B14F-4D97-AF65-F5344CB8AC3E}">
+        <p14:creationId xmlns:p14="http://schemas.microsoft.com/office/powerpoint/2010/main" val="4024909255"/>
+      </p:ext>
+    </p:extLst>
+  </p:cSld>
+  <p:clrMapOvr>
+    <a:masterClrMapping/>
+  </p:clrMapOvr>
+</p:sld>
+</file>
+
+<file path=ppt/slides/slide7.xml><?xml version="1.0" encoding="utf-8"?>
+<p:sld xmlns:a="http://schemas.openxmlformats.org/drawingml/2006/main" xmlns:r="http://schemas.openxmlformats.org/officeDocument/2006/relationships" xmlns:p="http://schemas.openxmlformats.org/presentationml/2006/main">
+  <p:cSld>
+    <p:bg>
+      <p:bgPr>
+        <a:solidFill>
+          <a:srgbClr val="EFEFEF"/>
+        </a:solidFill>
+        <a:effectLst/>
+      </p:bgPr>
+    </p:bg>
+    <p:spTree>
+      <p:nvGrpSpPr>
+        <p:cNvPr id="1" name=""/>
+        <p:cNvGrpSpPr/>
+        <p:nvPr/>
+      </p:nvGrpSpPr>
+      <p:grpSpPr>
+        <a:xfrm>
+          <a:off x="0" y="0"/>
+          <a:ext cx="0" cy="0"/>
+          <a:chOff x="0" y="0"/>
+          <a:chExt cx="0" cy="0"/>
+        </a:xfrm>
+      </p:grpSpPr>
+      <p:sp>
+        <p:nvSpPr>
+          <p:cNvPr id="11" name="CaixaDeTexto 10">
+            <a:extLst>
+              <a:ext uri="{FF2B5EF4-FFF2-40B4-BE49-F238E27FC236}">
+                <a16:creationId xmlns:a16="http://schemas.microsoft.com/office/drawing/2014/main" id="{DBEFC525-6F64-76E2-C98A-DA22D7B39FBB}"/>
+              </a:ext>
+            </a:extLst>
+          </p:cNvPr>
+          <p:cNvSpPr txBox="1"/>
+          <p:nvPr/>
+        </p:nvSpPr>
+        <p:spPr>
+          <a:xfrm>
+            <a:off x="10791713" y="6384477"/>
+            <a:ext cx="786396" cy="461665"/>
+          </a:xfrm>
+          <a:prstGeom prst="rect">
+            <a:avLst/>
+          </a:prstGeom>
+          <a:noFill/>
+        </p:spPr>
+        <p:txBody>
+          <a:bodyPr wrap="square" rtlCol="0">
+            <a:spAutoFit/>
+          </a:bodyPr>
+          <a:lstStyle/>
+          <a:p>
+            <a:r>
+              <a:rPr lang="pt-BR" sz="2400" b="1" dirty="0"/>
+              <a:t>&lt;</a:t>
+            </a:r>
+            <a:r>
+              <a:rPr lang="pt-BR" sz="2400" dirty="0"/>
+              <a:t>    </a:t>
+            </a:r>
+            <a:r>
+              <a:rPr lang="pt-BR" sz="2400" b="1" dirty="0">
+                <a:solidFill>
+                  <a:srgbClr val="DEA900"/>
+                </a:solidFill>
+              </a:rPr>
+              <a:t>&gt;</a:t>
+            </a:r>
+          </a:p>
+        </p:txBody>
+      </p:sp>
+      <p:cxnSp>
+        <p:nvCxnSpPr>
+          <p:cNvPr id="2" name="Conector reto 1">
+            <a:extLst>
+              <a:ext uri="{FF2B5EF4-FFF2-40B4-BE49-F238E27FC236}">
+                <a16:creationId xmlns:a16="http://schemas.microsoft.com/office/drawing/2014/main" id="{DB269D19-A271-5FEC-110E-9D2B87A521F7}"/>
+              </a:ext>
+            </a:extLst>
+          </p:cNvPr>
+          <p:cNvCxnSpPr/>
+          <p:nvPr/>
+        </p:nvCxnSpPr>
+        <p:spPr>
+          <a:xfrm>
+            <a:off x="717997" y="1503664"/>
+            <a:ext cx="10756006" cy="0"/>
+          </a:xfrm>
+          <a:prstGeom prst="line">
+            <a:avLst/>
+          </a:prstGeom>
+          <a:ln w="44450"/>
+        </p:spPr>
+        <p:style>
+          <a:lnRef idx="3">
+            <a:schemeClr val="accent3"/>
+          </a:lnRef>
+          <a:fillRef idx="0">
+            <a:schemeClr val="accent3"/>
+          </a:fillRef>
+          <a:effectRef idx="2">
+            <a:schemeClr val="accent3"/>
+          </a:effectRef>
+          <a:fontRef idx="minor">
+            <a:schemeClr val="tx1"/>
+          </a:fontRef>
+        </p:style>
+      </p:cxnSp>
+      <p:cxnSp>
+        <p:nvCxnSpPr>
+          <p:cNvPr id="3" name="Conector reto 2">
+            <a:extLst>
+              <a:ext uri="{FF2B5EF4-FFF2-40B4-BE49-F238E27FC236}">
+                <a16:creationId xmlns:a16="http://schemas.microsoft.com/office/drawing/2014/main" id="{68C3129B-3AB0-8ED9-403D-12F3BC15553E}"/>
+              </a:ext>
+            </a:extLst>
+          </p:cNvPr>
+          <p:cNvCxnSpPr>
+            <a:cxnSpLocks/>
+          </p:cNvCxnSpPr>
+          <p:nvPr/>
+        </p:nvCxnSpPr>
+        <p:spPr>
+          <a:xfrm>
+            <a:off x="6409276" y="1504670"/>
+            <a:ext cx="5077892" cy="0"/>
+          </a:xfrm>
+          <a:prstGeom prst="line">
+            <a:avLst/>
+          </a:prstGeom>
+          <a:ln w="44450">
+            <a:solidFill>
+              <a:srgbClr val="DEA900"/>
+            </a:solidFill>
+          </a:ln>
+        </p:spPr>
+        <p:style>
+          <a:lnRef idx="3">
+            <a:schemeClr val="accent4"/>
+          </a:lnRef>
+          <a:fillRef idx="0">
+            <a:schemeClr val="accent4"/>
+          </a:fillRef>
+          <a:effectRef idx="2">
+            <a:schemeClr val="accent4"/>
+          </a:effectRef>
+          <a:fontRef idx="minor">
+            <a:schemeClr val="tx1"/>
+          </a:fontRef>
+        </p:style>
+      </p:cxnSp>
+      <p:sp>
+        <p:nvSpPr>
+          <p:cNvPr id="5" name="CaixaDeTexto 4">
+            <a:extLst>
+              <a:ext uri="{FF2B5EF4-FFF2-40B4-BE49-F238E27FC236}">
+                <a16:creationId xmlns:a16="http://schemas.microsoft.com/office/drawing/2014/main" id="{ED301059-9039-08D9-A40F-3FD07B2F53E4}"/>
+              </a:ext>
+            </a:extLst>
+          </p:cNvPr>
+          <p:cNvSpPr txBox="1"/>
+          <p:nvPr/>
+        </p:nvSpPr>
+        <p:spPr>
+          <a:xfrm>
+            <a:off x="6914410" y="980676"/>
+            <a:ext cx="3740743" cy="400110"/>
+          </a:xfrm>
+          <a:prstGeom prst="rect">
+            <a:avLst/>
+          </a:prstGeom>
+          <a:noFill/>
+        </p:spPr>
+        <p:txBody>
+          <a:bodyPr wrap="square" rtlCol="0">
+            <a:spAutoFit/>
+          </a:bodyPr>
+          <a:lstStyle/>
+          <a:p>
+            <a:r>
+              <a:rPr lang="pt-BR" sz="2000" b="1" dirty="0">
+                <a:solidFill>
+                  <a:srgbClr val="DEA900"/>
+                </a:solidFill>
+                <a:latin typeface="Raleway" panose="020B0003030101060003" pitchFamily="34" charset="0"/>
+              </a:rPr>
+              <a:t>DIAGRAMA DE CASO DE USO</a:t>
+            </a:r>
+          </a:p>
+        </p:txBody>
+      </p:sp>
+      <p:sp>
+        <p:nvSpPr>
+          <p:cNvPr id="6" name="CaixaDeTexto 5">
+            <a:extLst>
+              <a:ext uri="{FF2B5EF4-FFF2-40B4-BE49-F238E27FC236}">
+                <a16:creationId xmlns:a16="http://schemas.microsoft.com/office/drawing/2014/main" id="{9DC781B3-8616-CFB8-8226-E680295EE6B9}"/>
+              </a:ext>
+            </a:extLst>
+          </p:cNvPr>
+          <p:cNvSpPr txBox="1"/>
+          <p:nvPr/>
+        </p:nvSpPr>
+        <p:spPr>
+          <a:xfrm>
+            <a:off x="1427663" y="980676"/>
+            <a:ext cx="3740743" cy="400110"/>
+          </a:xfrm>
+          <a:prstGeom prst="rect">
+            <a:avLst/>
+          </a:prstGeom>
+          <a:noFill/>
+        </p:spPr>
+        <p:txBody>
+          <a:bodyPr wrap="square" rtlCol="0">
+            <a:spAutoFit/>
+          </a:bodyPr>
+          <a:lstStyle/>
+          <a:p>
+            <a:r>
+              <a:rPr lang="pt-BR" sz="2000" b="1" dirty="0">
+                <a:solidFill>
+                  <a:schemeClr val="bg2">
+                    <a:lumMod val="90000"/>
+                  </a:schemeClr>
+                </a:solidFill>
+                <a:latin typeface="Raleway" panose="020B0003030101060003" pitchFamily="34" charset="0"/>
+              </a:rPr>
+              <a:t>PROJECT MODEL CANVAS</a:t>
+            </a:r>
+          </a:p>
+        </p:txBody>
+      </p:sp>
+      <p:pic>
+        <p:nvPicPr>
+          <p:cNvPr id="13" name="Imagem 12">
+            <a:extLst>
+              <a:ext uri="{FF2B5EF4-FFF2-40B4-BE49-F238E27FC236}">
+                <a16:creationId xmlns:a16="http://schemas.microsoft.com/office/drawing/2014/main" id="{BE5C652F-CAC8-FFC9-800E-A4565E7176E3}"/>
+              </a:ext>
+            </a:extLst>
+          </p:cNvPr>
+          <p:cNvPicPr>
+            <a:picLocks noChangeAspect="1"/>
+          </p:cNvPicPr>
+          <p:nvPr/>
+        </p:nvPicPr>
+        <p:blipFill>
+          <a:blip r:embed="rId2">
+            <a:extLst>
+              <a:ext uri="{28A0092B-C50C-407E-A947-70E740481C1C}">
+                <a14:useLocalDpi xmlns:a14="http://schemas.microsoft.com/office/drawing/2010/main" val="0"/>
+              </a:ext>
+            </a:extLst>
+          </a:blip>
+          <a:stretch>
+            <a:fillRect/>
+          </a:stretch>
+        </p:blipFill>
+        <p:spPr>
+          <a:xfrm>
+            <a:off x="3038171" y="1807290"/>
+            <a:ext cx="6115657" cy="4577187"/>
+          </a:xfrm>
+          <a:prstGeom prst="rect">
+            <a:avLst/>
+          </a:prstGeom>
+        </p:spPr>
+      </p:pic>
+      <p:sp>
+        <p:nvSpPr>
+          <p:cNvPr id="20" name="Retângulo 19">
+            <a:extLst>
+              <a:ext uri="{FF2B5EF4-FFF2-40B4-BE49-F238E27FC236}">
+                <a16:creationId xmlns:a16="http://schemas.microsoft.com/office/drawing/2014/main" id="{2EBCE57A-B709-BE08-7FDD-04F53DF8B72F}"/>
               </a:ext>
             </a:extLst>
           </p:cNvPr>
@@ -10715,20 +11523,15 @@
         </p:nvSpPr>
         <p:spPr>
           <a:xfrm>
-            <a:off x="717997" y="1817673"/>
-            <a:ext cx="10756006" cy="3068227"/>
-          </a:xfrm>
-          <a:prstGeom prst="roundRect">
-            <a:avLst>
-              <a:gd name="adj" fmla="val 2855"/>
-            </a:avLst>
+            <a:off x="0" y="0"/>
+            <a:ext cx="12192000" cy="785611"/>
+          </a:xfrm>
+          <a:prstGeom prst="rect">
+            <a:avLst/>
           </a:prstGeom>
           <a:solidFill>
-            <a:schemeClr val="bg1"/>
+            <a:schemeClr val="tx1"/>
           </a:solidFill>
-          <a:ln>
-            <a:noFill/>
-          </a:ln>
         </p:spPr>
         <p:style>
           <a:lnRef idx="2">
@@ -10757,10 +11560,10 @@
       </p:sp>
       <p:pic>
         <p:nvPicPr>
-          <p:cNvPr id="7" name="Imagem 6">
-            <a:extLst>
-              <a:ext uri="{FF2B5EF4-FFF2-40B4-BE49-F238E27FC236}">
-                <a16:creationId xmlns:a16="http://schemas.microsoft.com/office/drawing/2014/main" id="{9702E9D9-FB62-100D-3078-D9716BC30710}"/>
+          <p:cNvPr id="21" name="Imagem 20">
+            <a:extLst>
+              <a:ext uri="{FF2B5EF4-FFF2-40B4-BE49-F238E27FC236}">
+                <a16:creationId xmlns:a16="http://schemas.microsoft.com/office/drawing/2014/main" id="{5E40C2B0-BCED-A192-B300-AB36EF73FFCC}"/>
               </a:ext>
             </a:extLst>
           </p:cNvPr>
@@ -10770,7 +11573,7 @@
           <p:nvPr/>
         </p:nvPicPr>
         <p:blipFill>
-          <a:blip r:embed="rId2">
+          <a:blip r:embed="rId3">
             <a:extLst>
               <a:ext uri="{28A0092B-C50C-407E-A947-70E740481C1C}">
                 <a14:useLocalDpi xmlns:a14="http://schemas.microsoft.com/office/drawing/2010/main" val="0"/>
@@ -10783,14 +11586,248 @@
         </p:blipFill>
         <p:spPr>
           <a:xfrm>
-            <a:off x="182654" y="0"/>
-            <a:ext cx="782368" cy="785611"/>
+            <a:off x="185719" y="156924"/>
+            <a:ext cx="2064702" cy="508209"/>
           </a:xfrm>
           <a:prstGeom prst="rect">
             <a:avLst/>
           </a:prstGeom>
         </p:spPr>
       </p:pic>
+      <p:sp>
+        <p:nvSpPr>
+          <p:cNvPr id="22" name="Elipse 21">
+            <a:extLst>
+              <a:ext uri="{FF2B5EF4-FFF2-40B4-BE49-F238E27FC236}">
+                <a16:creationId xmlns:a16="http://schemas.microsoft.com/office/drawing/2014/main" id="{5118740C-5A7B-F020-9092-51A7D2AADD6E}"/>
+              </a:ext>
+            </a:extLst>
+          </p:cNvPr>
+          <p:cNvSpPr/>
+          <p:nvPr/>
+        </p:nvSpPr>
+        <p:spPr>
+          <a:xfrm>
+            <a:off x="11388372" y="102079"/>
+            <a:ext cx="590602" cy="590602"/>
+          </a:xfrm>
+          <a:prstGeom prst="ellipse">
+            <a:avLst/>
+          </a:prstGeom>
+          <a:solidFill>
+            <a:srgbClr val="DEA900"/>
+          </a:solidFill>
+          <a:ln>
+            <a:noFill/>
+          </a:ln>
+        </p:spPr>
+        <p:style>
+          <a:lnRef idx="2">
+            <a:schemeClr val="accent1">
+              <a:shade val="15000"/>
+            </a:schemeClr>
+          </a:lnRef>
+          <a:fillRef idx="1">
+            <a:schemeClr val="accent1"/>
+          </a:fillRef>
+          <a:effectRef idx="0">
+            <a:schemeClr val="accent1"/>
+          </a:effectRef>
+          <a:fontRef idx="minor">
+            <a:schemeClr val="lt1"/>
+          </a:fontRef>
+        </p:style>
+        <p:txBody>
+          <a:bodyPr rtlCol="0" anchor="ctr"/>
+          <a:lstStyle/>
+          <a:p>
+            <a:pPr algn="ctr"/>
+            <a:endParaRPr lang="pt-BR"/>
+          </a:p>
+        </p:txBody>
+      </p:sp>
+      <p:pic>
+        <p:nvPicPr>
+          <p:cNvPr id="23" name="Imagem 22">
+            <a:extLst>
+              <a:ext uri="{FF2B5EF4-FFF2-40B4-BE49-F238E27FC236}">
+                <a16:creationId xmlns:a16="http://schemas.microsoft.com/office/drawing/2014/main" id="{AF3D2B13-3C39-8F6A-A441-4F6CAEE1A2E0}"/>
+              </a:ext>
+            </a:extLst>
+          </p:cNvPr>
+          <p:cNvPicPr>
+            <a:picLocks noChangeAspect="1"/>
+          </p:cNvPicPr>
+          <p:nvPr/>
+        </p:nvPicPr>
+        <p:blipFill>
+          <a:blip r:embed="rId4">
+            <a:extLst>
+              <a:ext uri="{28A0092B-C50C-407E-A947-70E740481C1C}">
+                <a14:useLocalDpi xmlns:a14="http://schemas.microsoft.com/office/drawing/2010/main" val="0"/>
+              </a:ext>
+            </a:extLst>
+          </a:blip>
+          <a:stretch>
+            <a:fillRect/>
+          </a:stretch>
+        </p:blipFill>
+        <p:spPr>
+          <a:xfrm>
+            <a:off x="11377877" y="228600"/>
+            <a:ext cx="611591" cy="340364"/>
+          </a:xfrm>
+          <a:prstGeom prst="rect">
+            <a:avLst/>
+          </a:prstGeom>
+        </p:spPr>
+      </p:pic>
+    </p:spTree>
+    <p:extLst>
+      <p:ext uri="{BB962C8B-B14F-4D97-AF65-F5344CB8AC3E}">
+        <p14:creationId xmlns:p14="http://schemas.microsoft.com/office/powerpoint/2010/main" val="565650154"/>
+      </p:ext>
+    </p:extLst>
+  </p:cSld>
+  <p:clrMapOvr>
+    <a:masterClrMapping/>
+  </p:clrMapOvr>
+</p:sld>
+</file>
+
+<file path=ppt/slides/slide8.xml><?xml version="1.0" encoding="utf-8"?>
+<p:sld xmlns:a="http://schemas.openxmlformats.org/drawingml/2006/main" xmlns:r="http://schemas.openxmlformats.org/officeDocument/2006/relationships" xmlns:p="http://schemas.openxmlformats.org/presentationml/2006/main">
+  <p:cSld>
+    <p:bg>
+      <p:bgPr>
+        <a:solidFill>
+          <a:srgbClr val="EFEFEF"/>
+        </a:solidFill>
+        <a:effectLst/>
+      </p:bgPr>
+    </p:bg>
+    <p:spTree>
+      <p:nvGrpSpPr>
+        <p:cNvPr id="1" name=""/>
+        <p:cNvGrpSpPr/>
+        <p:nvPr/>
+      </p:nvGrpSpPr>
+      <p:grpSpPr>
+        <a:xfrm>
+          <a:off x="0" y="0"/>
+          <a:ext cx="0" cy="0"/>
+          <a:chOff x="0" y="0"/>
+          <a:chExt cx="0" cy="0"/>
+        </a:xfrm>
+      </p:grpSpPr>
+      <p:sp>
+        <p:nvSpPr>
+          <p:cNvPr id="48" name="Retângulo: Cantos Arredondados 47">
+            <a:extLst>
+              <a:ext uri="{FF2B5EF4-FFF2-40B4-BE49-F238E27FC236}">
+                <a16:creationId xmlns:a16="http://schemas.microsoft.com/office/drawing/2014/main" id="{4F872EB0-DAA6-2500-E4B5-1BF47D675FB6}"/>
+              </a:ext>
+            </a:extLst>
+          </p:cNvPr>
+          <p:cNvSpPr/>
+          <p:nvPr/>
+        </p:nvSpPr>
+        <p:spPr>
+          <a:xfrm>
+            <a:off x="717997" y="5103009"/>
+            <a:ext cx="10756006" cy="803704"/>
+          </a:xfrm>
+          <a:prstGeom prst="roundRect">
+            <a:avLst>
+              <a:gd name="adj" fmla="val 9647"/>
+            </a:avLst>
+          </a:prstGeom>
+          <a:solidFill>
+            <a:schemeClr val="bg1"/>
+          </a:solidFill>
+          <a:ln>
+            <a:noFill/>
+          </a:ln>
+        </p:spPr>
+        <p:style>
+          <a:lnRef idx="2">
+            <a:schemeClr val="accent1">
+              <a:shade val="15000"/>
+            </a:schemeClr>
+          </a:lnRef>
+          <a:fillRef idx="1">
+            <a:schemeClr val="accent1"/>
+          </a:fillRef>
+          <a:effectRef idx="0">
+            <a:schemeClr val="accent1"/>
+          </a:effectRef>
+          <a:fontRef idx="minor">
+            <a:schemeClr val="lt1"/>
+          </a:fontRef>
+        </p:style>
+        <p:txBody>
+          <a:bodyPr rtlCol="0" anchor="ctr"/>
+          <a:lstStyle/>
+          <a:p>
+            <a:pPr algn="ctr"/>
+            <a:endParaRPr lang="pt-BR"/>
+          </a:p>
+        </p:txBody>
+      </p:sp>
+      <p:sp>
+        <p:nvSpPr>
+          <p:cNvPr id="5" name="Retângulo: Cantos Arredondados 4">
+            <a:extLst>
+              <a:ext uri="{FF2B5EF4-FFF2-40B4-BE49-F238E27FC236}">
+                <a16:creationId xmlns:a16="http://schemas.microsoft.com/office/drawing/2014/main" id="{21600A88-5FBB-9B8C-1536-59181C8ECD63}"/>
+              </a:ext>
+            </a:extLst>
+          </p:cNvPr>
+          <p:cNvSpPr/>
+          <p:nvPr/>
+        </p:nvSpPr>
+        <p:spPr>
+          <a:xfrm>
+            <a:off x="717997" y="1817673"/>
+            <a:ext cx="10756006" cy="3068227"/>
+          </a:xfrm>
+          <a:prstGeom prst="roundRect">
+            <a:avLst>
+              <a:gd name="adj" fmla="val 2855"/>
+            </a:avLst>
+          </a:prstGeom>
+          <a:solidFill>
+            <a:schemeClr val="bg1"/>
+          </a:solidFill>
+          <a:ln>
+            <a:noFill/>
+          </a:ln>
+        </p:spPr>
+        <p:style>
+          <a:lnRef idx="2">
+            <a:schemeClr val="accent1">
+              <a:shade val="15000"/>
+            </a:schemeClr>
+          </a:lnRef>
+          <a:fillRef idx="1">
+            <a:schemeClr val="accent1"/>
+          </a:fillRef>
+          <a:effectRef idx="0">
+            <a:schemeClr val="accent1"/>
+          </a:effectRef>
+          <a:fontRef idx="minor">
+            <a:schemeClr val="lt1"/>
+          </a:fontRef>
+        </p:style>
+        <p:txBody>
+          <a:bodyPr rtlCol="0" anchor="ctr"/>
+          <a:lstStyle/>
+          <a:p>
+            <a:pPr algn="ctr"/>
+            <a:endParaRPr lang="pt-BR"/>
+          </a:p>
+        </p:txBody>
+      </p:sp>
       <p:cxnSp>
         <p:nvCxnSpPr>
           <p:cNvPr id="3" name="Conector reto 2">
@@ -10889,7 +11926,7 @@
           <p:nvPr/>
         </p:nvPicPr>
         <p:blipFill>
-          <a:blip r:embed="rId3">
+          <a:blip r:embed="rId2">
             <a:extLst>
               <a:ext uri="{28A0092B-C50C-407E-A947-70E740481C1C}">
                 <a14:useLocalDpi xmlns:a14="http://schemas.microsoft.com/office/drawing/2010/main" val="0"/>
@@ -10925,7 +11962,7 @@
           <p:nvPr/>
         </p:nvPicPr>
         <p:blipFill>
-          <a:blip r:embed="rId4">
+          <a:blip r:embed="rId3">
             <a:extLst>
               <a:ext uri="{28A0092B-C50C-407E-A947-70E740481C1C}">
                 <a14:useLocalDpi xmlns:a14="http://schemas.microsoft.com/office/drawing/2010/main" val="0"/>
@@ -10961,7 +11998,7 @@
           <p:nvPr/>
         </p:nvPicPr>
         <p:blipFill>
-          <a:blip r:embed="rId5">
+          <a:blip r:embed="rId4">
             <a:extLst>
               <a:ext uri="{28A0092B-C50C-407E-A947-70E740481C1C}">
                 <a14:useLocalDpi xmlns:a14="http://schemas.microsoft.com/office/drawing/2010/main" val="0"/>
@@ -10997,7 +12034,7 @@
           <p:nvPr/>
         </p:nvPicPr>
         <p:blipFill>
-          <a:blip r:embed="rId6">
+          <a:blip r:embed="rId5">
             <a:extLst>
               <a:ext uri="{28A0092B-C50C-407E-A947-70E740481C1C}">
                 <a14:useLocalDpi xmlns:a14="http://schemas.microsoft.com/office/drawing/2010/main" val="0"/>
@@ -11033,7 +12070,7 @@
           <p:nvPr/>
         </p:nvPicPr>
         <p:blipFill>
-          <a:blip r:embed="rId7">
+          <a:blip r:embed="rId6">
             <a:extLst>
               <a:ext uri="{28A0092B-C50C-407E-A947-70E740481C1C}">
                 <a14:useLocalDpi xmlns:a14="http://schemas.microsoft.com/office/drawing/2010/main" val="0"/>
@@ -11726,12 +12763,61 @@
           </a:p>
         </p:txBody>
       </p:sp>
+      <p:sp>
+        <p:nvSpPr>
+          <p:cNvPr id="15" name="Retângulo 14">
+            <a:extLst>
+              <a:ext uri="{FF2B5EF4-FFF2-40B4-BE49-F238E27FC236}">
+                <a16:creationId xmlns:a16="http://schemas.microsoft.com/office/drawing/2014/main" id="{2E8BAEEE-30E4-EFCF-EF28-56F43E0E7343}"/>
+              </a:ext>
+            </a:extLst>
+          </p:cNvPr>
+          <p:cNvSpPr/>
+          <p:nvPr/>
+        </p:nvSpPr>
+        <p:spPr>
+          <a:xfrm>
+            <a:off x="0" y="0"/>
+            <a:ext cx="12192000" cy="785611"/>
+          </a:xfrm>
+          <a:prstGeom prst="rect">
+            <a:avLst/>
+          </a:prstGeom>
+          <a:solidFill>
+            <a:schemeClr val="tx1"/>
+          </a:solidFill>
+        </p:spPr>
+        <p:style>
+          <a:lnRef idx="2">
+            <a:schemeClr val="accent1">
+              <a:shade val="15000"/>
+            </a:schemeClr>
+          </a:lnRef>
+          <a:fillRef idx="1">
+            <a:schemeClr val="accent1"/>
+          </a:fillRef>
+          <a:effectRef idx="0">
+            <a:schemeClr val="accent1"/>
+          </a:effectRef>
+          <a:fontRef idx="minor">
+            <a:schemeClr val="lt1"/>
+          </a:fontRef>
+        </p:style>
+        <p:txBody>
+          <a:bodyPr rtlCol="0" anchor="ctr"/>
+          <a:lstStyle/>
+          <a:p>
+            <a:pPr algn="ctr"/>
+            <a:endParaRPr lang="pt-BR"/>
+          </a:p>
+        </p:txBody>
+      </p:sp>
       <p:pic>
         <p:nvPicPr>
-          <p:cNvPr id="52" name="Imagem 51">
-            <a:extLst>
-              <a:ext uri="{FF2B5EF4-FFF2-40B4-BE49-F238E27FC236}">
-                <a16:creationId xmlns:a16="http://schemas.microsoft.com/office/drawing/2014/main" id="{B9AA9AE7-81A6-63F3-C88F-B6E5BFF2AAB0}"/>
+          <p:cNvPr id="16" name="Imagem 15">
+            <a:extLst>
+              <a:ext uri="{FF2B5EF4-FFF2-40B4-BE49-F238E27FC236}">
+                <a16:creationId xmlns:a16="http://schemas.microsoft.com/office/drawing/2014/main" id="{92B91A39-8D7E-5C35-454B-6F41E4D583E4}"/>
               </a:ext>
             </a:extLst>
           </p:cNvPr>
@@ -11741,7 +12827,7 @@
           <p:nvPr/>
         </p:nvPicPr>
         <p:blipFill>
-          <a:blip r:embed="rId8">
+          <a:blip r:embed="rId7">
             <a:extLst>
               <a:ext uri="{28A0092B-C50C-407E-A947-70E740481C1C}">
                 <a14:useLocalDpi xmlns:a14="http://schemas.microsoft.com/office/drawing/2010/main" val="0"/>
@@ -11754,8 +12840,96 @@
         </p:blipFill>
         <p:spPr>
           <a:xfrm>
-            <a:off x="11503473" y="194460"/>
-            <a:ext cx="396689" cy="396689"/>
+            <a:off x="185719" y="156924"/>
+            <a:ext cx="2064702" cy="508209"/>
+          </a:xfrm>
+          <a:prstGeom prst="rect">
+            <a:avLst/>
+          </a:prstGeom>
+        </p:spPr>
+      </p:pic>
+      <p:sp>
+        <p:nvSpPr>
+          <p:cNvPr id="17" name="Elipse 16">
+            <a:extLst>
+              <a:ext uri="{FF2B5EF4-FFF2-40B4-BE49-F238E27FC236}">
+                <a16:creationId xmlns:a16="http://schemas.microsoft.com/office/drawing/2014/main" id="{88FD3C46-460C-4FFB-85B3-8DC4A28AD033}"/>
+              </a:ext>
+            </a:extLst>
+          </p:cNvPr>
+          <p:cNvSpPr/>
+          <p:nvPr/>
+        </p:nvSpPr>
+        <p:spPr>
+          <a:xfrm>
+            <a:off x="11388372" y="102079"/>
+            <a:ext cx="590602" cy="590602"/>
+          </a:xfrm>
+          <a:prstGeom prst="ellipse">
+            <a:avLst/>
+          </a:prstGeom>
+          <a:solidFill>
+            <a:srgbClr val="DEA900"/>
+          </a:solidFill>
+          <a:ln>
+            <a:noFill/>
+          </a:ln>
+        </p:spPr>
+        <p:style>
+          <a:lnRef idx="2">
+            <a:schemeClr val="accent1">
+              <a:shade val="15000"/>
+            </a:schemeClr>
+          </a:lnRef>
+          <a:fillRef idx="1">
+            <a:schemeClr val="accent1"/>
+          </a:fillRef>
+          <a:effectRef idx="0">
+            <a:schemeClr val="accent1"/>
+          </a:effectRef>
+          <a:fontRef idx="minor">
+            <a:schemeClr val="lt1"/>
+          </a:fontRef>
+        </p:style>
+        <p:txBody>
+          <a:bodyPr rtlCol="0" anchor="ctr"/>
+          <a:lstStyle/>
+          <a:p>
+            <a:pPr algn="ctr"/>
+            <a:endParaRPr lang="pt-BR"/>
+          </a:p>
+        </p:txBody>
+      </p:sp>
+      <p:pic>
+        <p:nvPicPr>
+          <p:cNvPr id="18" name="Imagem 17">
+            <a:extLst>
+              <a:ext uri="{FF2B5EF4-FFF2-40B4-BE49-F238E27FC236}">
+                <a16:creationId xmlns:a16="http://schemas.microsoft.com/office/drawing/2014/main" id="{298B5182-1126-AD9E-8E54-C5FED195D121}"/>
+              </a:ext>
+            </a:extLst>
+          </p:cNvPr>
+          <p:cNvPicPr>
+            <a:picLocks noChangeAspect="1"/>
+          </p:cNvPicPr>
+          <p:nvPr/>
+        </p:nvPicPr>
+        <p:blipFill>
+          <a:blip r:embed="rId8">
+            <a:extLst>
+              <a:ext uri="{28A0092B-C50C-407E-A947-70E740481C1C}">
+                <a14:useLocalDpi xmlns:a14="http://schemas.microsoft.com/office/drawing/2010/main" val="0"/>
+              </a:ext>
+            </a:extLst>
+          </a:blip>
+          <a:stretch>
+            <a:fillRect/>
+          </a:stretch>
+        </p:blipFill>
+        <p:spPr>
+          <a:xfrm>
+            <a:off x="11377877" y="228600"/>
+            <a:ext cx="611591" cy="340364"/>
           </a:xfrm>
           <a:prstGeom prst="rect">
             <a:avLst/>

</xml_diff>